<commit_message>
Lesson 02. Fix task 1 conditions
</commit_message>
<xml_diff>
--- a/Lectures/Lesson 02 - Built-In Classes.pptx
+++ b/Lectures/Lesson 02 - Built-In Classes.pptx
@@ -2661,11 +2661,7 @@
             </a:r>
             <a:r>
               <a:rPr lang="en-US" dirty="0" smtClean="0"/>
-              <a:t> since java </a:t>
-            </a:r>
-            <a:r>
-              <a:rPr lang="en-US" dirty="0" smtClean="0"/>
-              <a:t>9</a:t>
+              <a:t> since java 9</a:t>
             </a:r>
           </a:p>
           <a:p>
@@ -22897,7 +22893,31 @@
               <a:rPr lang="en-US" altLang="en-US" sz="2000" dirty="0" smtClean="0">
                 <a:latin typeface="Calibri (Body)"/>
               </a:rPr>
-              <a:t>Implement the program for change the input string register. Read string from command line in runtime and do: </a:t>
+              <a:t>Implement the program for change the input string register. Read string from command line </a:t>
+            </a:r>
+            <a:r>
+              <a:rPr lang="en-US" altLang="en-US" sz="2000" dirty="0" smtClean="0">
+                <a:latin typeface="Calibri (Body)"/>
+              </a:rPr>
+              <a:t>argument during program </a:t>
+            </a:r>
+            <a:r>
+              <a:rPr lang="en-US" altLang="en-US" sz="2000" dirty="0" err="1" smtClean="0">
+                <a:latin typeface="Calibri (Body)"/>
+              </a:rPr>
+              <a:t>srartup</a:t>
+            </a:r>
+            <a:r>
+              <a:rPr lang="en-US" altLang="en-US" sz="2000" smtClean="0">
+                <a:latin typeface="Calibri (Body)"/>
+              </a:rPr>
+              <a:t> and </a:t>
+            </a:r>
+            <a:r>
+              <a:rPr lang="en-US" altLang="en-US" sz="2000" dirty="0" smtClean="0">
+                <a:latin typeface="Calibri (Body)"/>
+              </a:rPr>
+              <a:t>do: </a:t>
             </a:r>
           </a:p>
           <a:p>
@@ -22983,13 +23003,7 @@
               <a:rPr lang="en-US" altLang="en-US" sz="2000" dirty="0" smtClean="0">
                 <a:latin typeface="Calibri (Body)"/>
               </a:rPr>
-              <a:t> </a:t>
-            </a:r>
-            <a:r>
-              <a:rPr lang="en-US" altLang="en-US" sz="2000" dirty="0" smtClean="0">
-                <a:latin typeface="Calibri (Body)"/>
-              </a:rPr>
-              <a:t>should pass successfully.</a:t>
+              <a:t> should pass successfully.</a:t>
             </a:r>
             <a:endParaRPr lang="en-US" altLang="en-US" sz="2000" dirty="0">
               <a:latin typeface="Calibri (Body)"/>
@@ -23312,13 +23326,7 @@
               <a:rPr lang="en-US" altLang="en-US" sz="2000" dirty="0" smtClean="0">
                 <a:latin typeface="Calibri (Body)"/>
               </a:rPr>
-              <a:t> </a:t>
-            </a:r>
-            <a:r>
-              <a:rPr lang="en-US" altLang="en-US" sz="2000" dirty="0" smtClean="0">
-                <a:latin typeface="Calibri (Body)"/>
-              </a:rPr>
-              <a:t>should pass successfully</a:t>
+              <a:t> should pass successfully</a:t>
             </a:r>
           </a:p>
         </p:txBody>
@@ -23770,8 +23778,8 @@
           </a:p>
         </p:txBody>
       </p:sp>
-      <mc:AlternateContent xmlns:mc="http://schemas.openxmlformats.org/markup-compatibility/2006">
-        <mc:Choice xmlns:a14="http://schemas.microsoft.com/office/drawing/2010/main" Requires="a14">
+      <mc:AlternateContent xmlns:mc="http://schemas.openxmlformats.org/markup-compatibility/2006" xmlns:a14="http://schemas.microsoft.com/office/drawing/2010/main">
+        <mc:Choice Requires="a14">
           <p:sp>
             <p:nvSpPr>
               <p:cNvPr id="3" name="Объект 2"/>
@@ -23991,7 +23999,7 @@
             </p:txBody>
           </p:sp>
         </mc:Choice>
-        <mc:Fallback>
+        <mc:Fallback xmlns="">
           <p:sp>
             <p:nvSpPr>
               <p:cNvPr id="3" name="Объект 2"/>

</xml_diff>

<commit_message>
Lesson 02. Fix task 1 typo
</commit_message>
<xml_diff>
--- a/Lectures/Lesson 02 - Built-In Classes.pptx
+++ b/Lectures/Lesson 02 - Built-In Classes.pptx
@@ -231,7 +231,7 @@
           <a:p>
             <a:fld id="{E02A8A83-6CB5-4597-88C8-473182A1D80C}" type="datetimeFigureOut">
               <a:rPr lang="en-US" smtClean="0"/>
-              <a:t>10/15/2018</a:t>
+              <a:t>20-Oct-18</a:t>
             </a:fld>
             <a:endParaRPr lang="en-US"/>
           </a:p>
@@ -3260,7 +3260,7 @@
           <a:p>
             <a:fld id="{EEB28C23-52B7-4DED-9EA2-9F92B91AC614}" type="datetimeFigureOut">
               <a:rPr lang="en-US" smtClean="0"/>
-              <a:t>10/15/2018</a:t>
+              <a:t>20-Oct-18</a:t>
             </a:fld>
             <a:endParaRPr lang="en-US"/>
           </a:p>
@@ -3430,7 +3430,7 @@
           <a:p>
             <a:fld id="{EEB28C23-52B7-4DED-9EA2-9F92B91AC614}" type="datetimeFigureOut">
               <a:rPr lang="en-US" smtClean="0"/>
-              <a:t>10/15/2018</a:t>
+              <a:t>20-Oct-18</a:t>
             </a:fld>
             <a:endParaRPr lang="en-US"/>
           </a:p>
@@ -3610,7 +3610,7 @@
           <a:p>
             <a:fld id="{EEB28C23-52B7-4DED-9EA2-9F92B91AC614}" type="datetimeFigureOut">
               <a:rPr lang="en-US" smtClean="0"/>
-              <a:t>10/15/2018</a:t>
+              <a:t>20-Oct-18</a:t>
             </a:fld>
             <a:endParaRPr lang="en-US"/>
           </a:p>
@@ -3780,7 +3780,7 @@
           <a:p>
             <a:fld id="{EEB28C23-52B7-4DED-9EA2-9F92B91AC614}" type="datetimeFigureOut">
               <a:rPr lang="en-US" smtClean="0"/>
-              <a:t>10/15/2018</a:t>
+              <a:t>20-Oct-18</a:t>
             </a:fld>
             <a:endParaRPr lang="en-US"/>
           </a:p>
@@ -4026,7 +4026,7 @@
           <a:p>
             <a:fld id="{EEB28C23-52B7-4DED-9EA2-9F92B91AC614}" type="datetimeFigureOut">
               <a:rPr lang="en-US" smtClean="0"/>
-              <a:t>10/15/2018</a:t>
+              <a:t>20-Oct-18</a:t>
             </a:fld>
             <a:endParaRPr lang="en-US"/>
           </a:p>
@@ -4258,7 +4258,7 @@
           <a:p>
             <a:fld id="{EEB28C23-52B7-4DED-9EA2-9F92B91AC614}" type="datetimeFigureOut">
               <a:rPr lang="en-US" smtClean="0"/>
-              <a:t>10/15/2018</a:t>
+              <a:t>20-Oct-18</a:t>
             </a:fld>
             <a:endParaRPr lang="en-US"/>
           </a:p>
@@ -4625,7 +4625,7 @@
           <a:p>
             <a:fld id="{EEB28C23-52B7-4DED-9EA2-9F92B91AC614}" type="datetimeFigureOut">
               <a:rPr lang="en-US" smtClean="0"/>
-              <a:t>10/15/2018</a:t>
+              <a:t>20-Oct-18</a:t>
             </a:fld>
             <a:endParaRPr lang="en-US"/>
           </a:p>
@@ -4743,7 +4743,7 @@
           <a:p>
             <a:fld id="{EEB28C23-52B7-4DED-9EA2-9F92B91AC614}" type="datetimeFigureOut">
               <a:rPr lang="en-US" smtClean="0"/>
-              <a:t>10/15/2018</a:t>
+              <a:t>20-Oct-18</a:t>
             </a:fld>
             <a:endParaRPr lang="en-US"/>
           </a:p>
@@ -4838,7 +4838,7 @@
           <a:p>
             <a:fld id="{EEB28C23-52B7-4DED-9EA2-9F92B91AC614}" type="datetimeFigureOut">
               <a:rPr lang="en-US" smtClean="0"/>
-              <a:t>10/15/2018</a:t>
+              <a:t>20-Oct-18</a:t>
             </a:fld>
             <a:endParaRPr lang="en-US"/>
           </a:p>
@@ -5115,7 +5115,7 @@
           <a:p>
             <a:fld id="{EEB28C23-52B7-4DED-9EA2-9F92B91AC614}" type="datetimeFigureOut">
               <a:rPr lang="en-US" smtClean="0"/>
-              <a:t>10/15/2018</a:t>
+              <a:t>20-Oct-18</a:t>
             </a:fld>
             <a:endParaRPr lang="en-US"/>
           </a:p>
@@ -5368,7 +5368,7 @@
           <a:p>
             <a:fld id="{EEB28C23-52B7-4DED-9EA2-9F92B91AC614}" type="datetimeFigureOut">
               <a:rPr lang="en-US" smtClean="0"/>
-              <a:t>10/15/2018</a:t>
+              <a:t>20-Oct-18</a:t>
             </a:fld>
             <a:endParaRPr lang="en-US"/>
           </a:p>
@@ -5581,7 +5581,7 @@
           <a:p>
             <a:fld id="{EEB28C23-52B7-4DED-9EA2-9F92B91AC614}" type="datetimeFigureOut">
               <a:rPr lang="en-US" smtClean="0"/>
-              <a:t>10/15/2018</a:t>
+              <a:t>20-Oct-18</a:t>
             </a:fld>
             <a:endParaRPr lang="en-US"/>
           </a:p>
@@ -6095,7 +6095,7 @@
           <p:cNvPr id="4" name="Rectangle 1">
             <a:extLst>
               <a:ext uri="{FF2B5EF4-FFF2-40B4-BE49-F238E27FC236}">
-                <a16:creationId xmlns:a16="http://schemas.microsoft.com/office/drawing/2014/main" id="{49FA7502-C7F3-4D88-90B1-11FA533A3F80}"/>
+                <a16:creationId xmlns:a16="http://schemas.microsoft.com/office/drawing/2014/main" xmlns="" id="{49FA7502-C7F3-4D88-90B1-11FA533A3F80}"/>
               </a:ext>
             </a:extLst>
           </p:cNvPr>
@@ -6184,7 +6184,7 @@
           <p:cNvPr id="5" name="Rectangle 1">
             <a:extLst>
               <a:ext uri="{FF2B5EF4-FFF2-40B4-BE49-F238E27FC236}">
-                <a16:creationId xmlns:a16="http://schemas.microsoft.com/office/drawing/2014/main" id="{C177939B-D70B-47A3-A4A9-6AF0F29F2F0B}"/>
+                <a16:creationId xmlns:a16="http://schemas.microsoft.com/office/drawing/2014/main" xmlns="" id="{C177939B-D70B-47A3-A4A9-6AF0F29F2F0B}"/>
               </a:ext>
             </a:extLst>
           </p:cNvPr>
@@ -6273,7 +6273,7 @@
           <p:cNvPr id="6" name="Rectangle 1">
             <a:extLst>
               <a:ext uri="{FF2B5EF4-FFF2-40B4-BE49-F238E27FC236}">
-                <a16:creationId xmlns:a16="http://schemas.microsoft.com/office/drawing/2014/main" id="{7681AF85-EE99-42E3-9B45-F88BCD1E401F}"/>
+                <a16:creationId xmlns:a16="http://schemas.microsoft.com/office/drawing/2014/main" xmlns="" id="{7681AF85-EE99-42E3-9B45-F88BCD1E401F}"/>
               </a:ext>
             </a:extLst>
           </p:cNvPr>
@@ -6464,7 +6464,7 @@
           <p:cNvPr id="4" name="Rectangle 1">
             <a:extLst>
               <a:ext uri="{FF2B5EF4-FFF2-40B4-BE49-F238E27FC236}">
-                <a16:creationId xmlns:a16="http://schemas.microsoft.com/office/drawing/2014/main" id="{49FA7502-C7F3-4D88-90B1-11FA533A3F80}"/>
+                <a16:creationId xmlns:a16="http://schemas.microsoft.com/office/drawing/2014/main" xmlns="" id="{49FA7502-C7F3-4D88-90B1-11FA533A3F80}"/>
               </a:ext>
             </a:extLst>
           </p:cNvPr>
@@ -6553,7 +6553,7 @@
           <p:cNvPr id="5" name="Rectangle 1">
             <a:extLst>
               <a:ext uri="{FF2B5EF4-FFF2-40B4-BE49-F238E27FC236}">
-                <a16:creationId xmlns:a16="http://schemas.microsoft.com/office/drawing/2014/main" id="{C177939B-D70B-47A3-A4A9-6AF0F29F2F0B}"/>
+                <a16:creationId xmlns:a16="http://schemas.microsoft.com/office/drawing/2014/main" xmlns="" id="{C177939B-D70B-47A3-A4A9-6AF0F29F2F0B}"/>
               </a:ext>
             </a:extLst>
           </p:cNvPr>
@@ -6642,7 +6642,7 @@
           <p:cNvPr id="6" name="Rectangle 1">
             <a:extLst>
               <a:ext uri="{FF2B5EF4-FFF2-40B4-BE49-F238E27FC236}">
-                <a16:creationId xmlns:a16="http://schemas.microsoft.com/office/drawing/2014/main" id="{7681AF85-EE99-42E3-9B45-F88BCD1E401F}"/>
+                <a16:creationId xmlns:a16="http://schemas.microsoft.com/office/drawing/2014/main" xmlns="" id="{7681AF85-EE99-42E3-9B45-F88BCD1E401F}"/>
               </a:ext>
             </a:extLst>
           </p:cNvPr>
@@ -6731,7 +6731,7 @@
           <p:cNvPr id="4098" name="Picture 2" descr="Картинки по запросу java wrapper classes">
             <a:extLst>
               <a:ext uri="{FF2B5EF4-FFF2-40B4-BE49-F238E27FC236}">
-                <a16:creationId xmlns:a16="http://schemas.microsoft.com/office/drawing/2014/main" id="{BB194607-FF31-48F4-9F5D-5F577D30A8E4}"/>
+                <a16:creationId xmlns:a16="http://schemas.microsoft.com/office/drawing/2014/main" xmlns="" id="{BB194607-FF31-48F4-9F5D-5F577D30A8E4}"/>
               </a:ext>
             </a:extLst>
           </p:cNvPr>
@@ -6841,7 +6841,7 @@
           <p:cNvPr id="4" name="Rectangle 1">
             <a:extLst>
               <a:ext uri="{FF2B5EF4-FFF2-40B4-BE49-F238E27FC236}">
-                <a16:creationId xmlns:a16="http://schemas.microsoft.com/office/drawing/2014/main" id="{49FA7502-C7F3-4D88-90B1-11FA533A3F80}"/>
+                <a16:creationId xmlns:a16="http://schemas.microsoft.com/office/drawing/2014/main" xmlns="" id="{49FA7502-C7F3-4D88-90B1-11FA533A3F80}"/>
               </a:ext>
             </a:extLst>
           </p:cNvPr>
@@ -6930,7 +6930,7 @@
           <p:cNvPr id="5" name="Rectangle 1">
             <a:extLst>
               <a:ext uri="{FF2B5EF4-FFF2-40B4-BE49-F238E27FC236}">
-                <a16:creationId xmlns:a16="http://schemas.microsoft.com/office/drawing/2014/main" id="{C177939B-D70B-47A3-A4A9-6AF0F29F2F0B}"/>
+                <a16:creationId xmlns:a16="http://schemas.microsoft.com/office/drawing/2014/main" xmlns="" id="{C177939B-D70B-47A3-A4A9-6AF0F29F2F0B}"/>
               </a:ext>
             </a:extLst>
           </p:cNvPr>
@@ -7019,7 +7019,7 @@
           <p:cNvPr id="6" name="Rectangle 1">
             <a:extLst>
               <a:ext uri="{FF2B5EF4-FFF2-40B4-BE49-F238E27FC236}">
-                <a16:creationId xmlns:a16="http://schemas.microsoft.com/office/drawing/2014/main" id="{7681AF85-EE99-42E3-9B45-F88BCD1E401F}"/>
+                <a16:creationId xmlns:a16="http://schemas.microsoft.com/office/drawing/2014/main" xmlns="" id="{7681AF85-EE99-42E3-9B45-F88BCD1E401F}"/>
               </a:ext>
             </a:extLst>
           </p:cNvPr>
@@ -7108,7 +7108,7 @@
           <p:cNvPr id="7" name="Місце для вмісту 6">
             <a:extLst>
               <a:ext uri="{FF2B5EF4-FFF2-40B4-BE49-F238E27FC236}">
-                <a16:creationId xmlns:a16="http://schemas.microsoft.com/office/drawing/2014/main" id="{34542A16-4DE8-4573-AD11-B774BE766351}"/>
+                <a16:creationId xmlns:a16="http://schemas.microsoft.com/office/drawing/2014/main" xmlns="" id="{34542A16-4DE8-4573-AD11-B774BE766351}"/>
               </a:ext>
             </a:extLst>
           </p:cNvPr>
@@ -7790,7 +7790,7 @@
           <p:cNvPr id="8" name="Rectangle 1">
             <a:extLst>
               <a:ext uri="{FF2B5EF4-FFF2-40B4-BE49-F238E27FC236}">
-                <a16:creationId xmlns:a16="http://schemas.microsoft.com/office/drawing/2014/main" id="{827D7488-B4AC-4BE5-BA99-AFD01D3D8B4D}"/>
+                <a16:creationId xmlns:a16="http://schemas.microsoft.com/office/drawing/2014/main" xmlns="" id="{827D7488-B4AC-4BE5-BA99-AFD01D3D8B4D}"/>
               </a:ext>
             </a:extLst>
           </p:cNvPr>
@@ -7879,7 +7879,7 @@
           <p:cNvPr id="5123" name="Picture 3" descr="Картинки по запросу java wrapper memes">
             <a:extLst>
               <a:ext uri="{FF2B5EF4-FFF2-40B4-BE49-F238E27FC236}">
-                <a16:creationId xmlns:a16="http://schemas.microsoft.com/office/drawing/2014/main" id="{9D633EF4-96C9-4BF5-A04D-326D598892A8}"/>
+                <a16:creationId xmlns:a16="http://schemas.microsoft.com/office/drawing/2014/main" xmlns="" id="{9D633EF4-96C9-4BF5-A04D-326D598892A8}"/>
               </a:ext>
             </a:extLst>
           </p:cNvPr>
@@ -7956,7 +7956,7 @@
           <p:cNvPr id="2" name="Заголовок 1">
             <a:extLst>
               <a:ext uri="{FF2B5EF4-FFF2-40B4-BE49-F238E27FC236}">
-                <a16:creationId xmlns:a16="http://schemas.microsoft.com/office/drawing/2014/main" id="{C17FB865-FF61-4BD1-8F86-3CE702DA9F0A}"/>
+                <a16:creationId xmlns:a16="http://schemas.microsoft.com/office/drawing/2014/main" xmlns="" id="{C17FB865-FF61-4BD1-8F86-3CE702DA9F0A}"/>
               </a:ext>
             </a:extLst>
           </p:cNvPr>
@@ -7984,7 +7984,7 @@
           <p:cNvPr id="3" name="Місце для вмісту 2">
             <a:extLst>
               <a:ext uri="{FF2B5EF4-FFF2-40B4-BE49-F238E27FC236}">
-                <a16:creationId xmlns:a16="http://schemas.microsoft.com/office/drawing/2014/main" id="{79C6C776-25C2-4C04-B815-5F0950131910}"/>
+                <a16:creationId xmlns:a16="http://schemas.microsoft.com/office/drawing/2014/main" xmlns="" id="{79C6C776-25C2-4C04-B815-5F0950131910}"/>
               </a:ext>
             </a:extLst>
           </p:cNvPr>
@@ -8561,7 +8561,7 @@
           <p:cNvPr id="4" name="Rectangle 1">
             <a:extLst>
               <a:ext uri="{FF2B5EF4-FFF2-40B4-BE49-F238E27FC236}">
-                <a16:creationId xmlns:a16="http://schemas.microsoft.com/office/drawing/2014/main" id="{979D964C-1828-4D2F-9501-23DD2C8AAAE4}"/>
+                <a16:creationId xmlns:a16="http://schemas.microsoft.com/office/drawing/2014/main" xmlns="" id="{979D964C-1828-4D2F-9501-23DD2C8AAAE4}"/>
               </a:ext>
             </a:extLst>
           </p:cNvPr>
@@ -8703,7 +8703,7 @@
           <p:cNvPr id="4" name="Rectangle 1">
             <a:extLst>
               <a:ext uri="{FF2B5EF4-FFF2-40B4-BE49-F238E27FC236}">
-                <a16:creationId xmlns:a16="http://schemas.microsoft.com/office/drawing/2014/main" id="{BC6BEE82-5395-46C7-9E23-FBD96DC09ADE}"/>
+                <a16:creationId xmlns:a16="http://schemas.microsoft.com/office/drawing/2014/main" xmlns="" id="{BC6BEE82-5395-46C7-9E23-FBD96DC09ADE}"/>
               </a:ext>
             </a:extLst>
           </p:cNvPr>
@@ -8792,7 +8792,7 @@
           <p:cNvPr id="5" name="Rectangle 2">
             <a:extLst>
               <a:ext uri="{FF2B5EF4-FFF2-40B4-BE49-F238E27FC236}">
-                <a16:creationId xmlns:a16="http://schemas.microsoft.com/office/drawing/2014/main" id="{C95426CD-B93A-41D0-AABA-159297A13705}"/>
+                <a16:creationId xmlns:a16="http://schemas.microsoft.com/office/drawing/2014/main" xmlns="" id="{C95426CD-B93A-41D0-AABA-159297A13705}"/>
               </a:ext>
             </a:extLst>
           </p:cNvPr>
@@ -8881,7 +8881,7 @@
           <p:cNvPr id="6" name="Rectangle 3">
             <a:extLst>
               <a:ext uri="{FF2B5EF4-FFF2-40B4-BE49-F238E27FC236}">
-                <a16:creationId xmlns:a16="http://schemas.microsoft.com/office/drawing/2014/main" id="{FBA5966C-1116-4EB7-9790-D214684405CE}"/>
+                <a16:creationId xmlns:a16="http://schemas.microsoft.com/office/drawing/2014/main" xmlns="" id="{FBA5966C-1116-4EB7-9790-D214684405CE}"/>
               </a:ext>
             </a:extLst>
           </p:cNvPr>
@@ -8970,7 +8970,7 @@
           <p:cNvPr id="7" name="Rectangle 4">
             <a:extLst>
               <a:ext uri="{FF2B5EF4-FFF2-40B4-BE49-F238E27FC236}">
-                <a16:creationId xmlns:a16="http://schemas.microsoft.com/office/drawing/2014/main" id="{C2D019D7-251B-49EB-A684-579033DE36FD}"/>
+                <a16:creationId xmlns:a16="http://schemas.microsoft.com/office/drawing/2014/main" xmlns="" id="{C2D019D7-251B-49EB-A684-579033DE36FD}"/>
               </a:ext>
             </a:extLst>
           </p:cNvPr>
@@ -9779,7 +9779,7 @@
           <p:cNvPr id="4" name="Rectangle 1">
             <a:extLst>
               <a:ext uri="{FF2B5EF4-FFF2-40B4-BE49-F238E27FC236}">
-                <a16:creationId xmlns:a16="http://schemas.microsoft.com/office/drawing/2014/main" id="{BC6BEE82-5395-46C7-9E23-FBD96DC09ADE}"/>
+                <a16:creationId xmlns:a16="http://schemas.microsoft.com/office/drawing/2014/main" xmlns="" id="{BC6BEE82-5395-46C7-9E23-FBD96DC09ADE}"/>
               </a:ext>
             </a:extLst>
           </p:cNvPr>
@@ -9868,7 +9868,7 @@
           <p:cNvPr id="5" name="Rectangle 2">
             <a:extLst>
               <a:ext uri="{FF2B5EF4-FFF2-40B4-BE49-F238E27FC236}">
-                <a16:creationId xmlns:a16="http://schemas.microsoft.com/office/drawing/2014/main" id="{C95426CD-B93A-41D0-AABA-159297A13705}"/>
+                <a16:creationId xmlns:a16="http://schemas.microsoft.com/office/drawing/2014/main" xmlns="" id="{C95426CD-B93A-41D0-AABA-159297A13705}"/>
               </a:ext>
             </a:extLst>
           </p:cNvPr>
@@ -9957,7 +9957,7 @@
           <p:cNvPr id="6" name="Rectangle 3">
             <a:extLst>
               <a:ext uri="{FF2B5EF4-FFF2-40B4-BE49-F238E27FC236}">
-                <a16:creationId xmlns:a16="http://schemas.microsoft.com/office/drawing/2014/main" id="{FBA5966C-1116-4EB7-9790-D214684405CE}"/>
+                <a16:creationId xmlns:a16="http://schemas.microsoft.com/office/drawing/2014/main" xmlns="" id="{FBA5966C-1116-4EB7-9790-D214684405CE}"/>
               </a:ext>
             </a:extLst>
           </p:cNvPr>
@@ -10046,7 +10046,7 @@
           <p:cNvPr id="7" name="Rectangle 4">
             <a:extLst>
               <a:ext uri="{FF2B5EF4-FFF2-40B4-BE49-F238E27FC236}">
-                <a16:creationId xmlns:a16="http://schemas.microsoft.com/office/drawing/2014/main" id="{C2D019D7-251B-49EB-A684-579033DE36FD}"/>
+                <a16:creationId xmlns:a16="http://schemas.microsoft.com/office/drawing/2014/main" xmlns="" id="{C2D019D7-251B-49EB-A684-579033DE36FD}"/>
               </a:ext>
             </a:extLst>
           </p:cNvPr>
@@ -10135,7 +10135,7 @@
           <p:cNvPr id="8" name="Rectangle 5">
             <a:extLst>
               <a:ext uri="{FF2B5EF4-FFF2-40B4-BE49-F238E27FC236}">
-                <a16:creationId xmlns:a16="http://schemas.microsoft.com/office/drawing/2014/main" id="{7C76EB3B-6948-413E-86A3-D2C8C27463F1}"/>
+                <a16:creationId xmlns:a16="http://schemas.microsoft.com/office/drawing/2014/main" xmlns="" id="{7C76EB3B-6948-413E-86A3-D2C8C27463F1}"/>
               </a:ext>
             </a:extLst>
           </p:cNvPr>
@@ -12049,7 +12049,7 @@
           <p:cNvPr id="4" name="Rectangle 1">
             <a:extLst>
               <a:ext uri="{FF2B5EF4-FFF2-40B4-BE49-F238E27FC236}">
-                <a16:creationId xmlns:a16="http://schemas.microsoft.com/office/drawing/2014/main" id="{49FA7502-C7F3-4D88-90B1-11FA533A3F80}"/>
+                <a16:creationId xmlns:a16="http://schemas.microsoft.com/office/drawing/2014/main" xmlns="" id="{49FA7502-C7F3-4D88-90B1-11FA533A3F80}"/>
               </a:ext>
             </a:extLst>
           </p:cNvPr>
@@ -13633,7 +13633,7 @@
           <p:cNvPr id="4" name="Rectangle 1">
             <a:extLst>
               <a:ext uri="{FF2B5EF4-FFF2-40B4-BE49-F238E27FC236}">
-                <a16:creationId xmlns:a16="http://schemas.microsoft.com/office/drawing/2014/main" id="{49FA7502-C7F3-4D88-90B1-11FA533A3F80}"/>
+                <a16:creationId xmlns:a16="http://schemas.microsoft.com/office/drawing/2014/main" xmlns="" id="{49FA7502-C7F3-4D88-90B1-11FA533A3F80}"/>
               </a:ext>
             </a:extLst>
           </p:cNvPr>
@@ -13722,7 +13722,7 @@
           <p:cNvPr id="5" name="Rectangle 1">
             <a:extLst>
               <a:ext uri="{FF2B5EF4-FFF2-40B4-BE49-F238E27FC236}">
-                <a16:creationId xmlns:a16="http://schemas.microsoft.com/office/drawing/2014/main" id="{C177939B-D70B-47A3-A4A9-6AF0F29F2F0B}"/>
+                <a16:creationId xmlns:a16="http://schemas.microsoft.com/office/drawing/2014/main" xmlns="" id="{C177939B-D70B-47A3-A4A9-6AF0F29F2F0B}"/>
               </a:ext>
             </a:extLst>
           </p:cNvPr>
@@ -13811,7 +13811,7 @@
           <p:cNvPr id="6" name="Rectangle 1">
             <a:extLst>
               <a:ext uri="{FF2B5EF4-FFF2-40B4-BE49-F238E27FC236}">
-                <a16:creationId xmlns:a16="http://schemas.microsoft.com/office/drawing/2014/main" id="{7681AF85-EE99-42E3-9B45-F88BCD1E401F}"/>
+                <a16:creationId xmlns:a16="http://schemas.microsoft.com/office/drawing/2014/main" xmlns="" id="{7681AF85-EE99-42E3-9B45-F88BCD1E401F}"/>
               </a:ext>
             </a:extLst>
           </p:cNvPr>
@@ -13900,7 +13900,7 @@
           <p:cNvPr id="7" name="Місце для вмісту 6">
             <a:extLst>
               <a:ext uri="{FF2B5EF4-FFF2-40B4-BE49-F238E27FC236}">
-                <a16:creationId xmlns:a16="http://schemas.microsoft.com/office/drawing/2014/main" id="{34542A16-4DE8-4573-AD11-B774BE766351}"/>
+                <a16:creationId xmlns:a16="http://schemas.microsoft.com/office/drawing/2014/main" xmlns="" id="{34542A16-4DE8-4573-AD11-B774BE766351}"/>
               </a:ext>
             </a:extLst>
           </p:cNvPr>
@@ -14668,7 +14668,7 @@
           <p:cNvPr id="8" name="Rectangle 1">
             <a:extLst>
               <a:ext uri="{FF2B5EF4-FFF2-40B4-BE49-F238E27FC236}">
-                <a16:creationId xmlns:a16="http://schemas.microsoft.com/office/drawing/2014/main" id="{827D7488-B4AC-4BE5-BA99-AFD01D3D8B4D}"/>
+                <a16:creationId xmlns:a16="http://schemas.microsoft.com/office/drawing/2014/main" xmlns="" id="{827D7488-B4AC-4BE5-BA99-AFD01D3D8B4D}"/>
               </a:ext>
             </a:extLst>
           </p:cNvPr>
@@ -14757,7 +14757,7 @@
           <p:cNvPr id="3" name="Rectangle 1">
             <a:extLst>
               <a:ext uri="{FF2B5EF4-FFF2-40B4-BE49-F238E27FC236}">
-                <a16:creationId xmlns:a16="http://schemas.microsoft.com/office/drawing/2014/main" id="{08D55DE2-58D1-45FB-8721-9777487B8420}"/>
+                <a16:creationId xmlns:a16="http://schemas.microsoft.com/office/drawing/2014/main" xmlns="" id="{08D55DE2-58D1-45FB-8721-9777487B8420}"/>
               </a:ext>
             </a:extLst>
           </p:cNvPr>
@@ -14899,7 +14899,7 @@
           <p:cNvPr id="4" name="Rectangle 1">
             <a:extLst>
               <a:ext uri="{FF2B5EF4-FFF2-40B4-BE49-F238E27FC236}">
-                <a16:creationId xmlns:a16="http://schemas.microsoft.com/office/drawing/2014/main" id="{49FA7502-C7F3-4D88-90B1-11FA533A3F80}"/>
+                <a16:creationId xmlns:a16="http://schemas.microsoft.com/office/drawing/2014/main" xmlns="" id="{49FA7502-C7F3-4D88-90B1-11FA533A3F80}"/>
               </a:ext>
             </a:extLst>
           </p:cNvPr>
@@ -14988,7 +14988,7 @@
           <p:cNvPr id="5" name="Rectangle 1">
             <a:extLst>
               <a:ext uri="{FF2B5EF4-FFF2-40B4-BE49-F238E27FC236}">
-                <a16:creationId xmlns:a16="http://schemas.microsoft.com/office/drawing/2014/main" id="{C177939B-D70B-47A3-A4A9-6AF0F29F2F0B}"/>
+                <a16:creationId xmlns:a16="http://schemas.microsoft.com/office/drawing/2014/main" xmlns="" id="{C177939B-D70B-47A3-A4A9-6AF0F29F2F0B}"/>
               </a:ext>
             </a:extLst>
           </p:cNvPr>
@@ -15077,7 +15077,7 @@
           <p:cNvPr id="6" name="Rectangle 1">
             <a:extLst>
               <a:ext uri="{FF2B5EF4-FFF2-40B4-BE49-F238E27FC236}">
-                <a16:creationId xmlns:a16="http://schemas.microsoft.com/office/drawing/2014/main" id="{7681AF85-EE99-42E3-9B45-F88BCD1E401F}"/>
+                <a16:creationId xmlns:a16="http://schemas.microsoft.com/office/drawing/2014/main" xmlns="" id="{7681AF85-EE99-42E3-9B45-F88BCD1E401F}"/>
               </a:ext>
             </a:extLst>
           </p:cNvPr>
@@ -15166,7 +15166,7 @@
           <p:cNvPr id="7" name="Місце для вмісту 6">
             <a:extLst>
               <a:ext uri="{FF2B5EF4-FFF2-40B4-BE49-F238E27FC236}">
-                <a16:creationId xmlns:a16="http://schemas.microsoft.com/office/drawing/2014/main" id="{34542A16-4DE8-4573-AD11-B774BE766351}"/>
+                <a16:creationId xmlns:a16="http://schemas.microsoft.com/office/drawing/2014/main" xmlns="" id="{34542A16-4DE8-4573-AD11-B774BE766351}"/>
               </a:ext>
             </a:extLst>
           </p:cNvPr>
@@ -15502,7 +15502,7 @@
           <p:cNvPr id="8" name="Rectangle 1">
             <a:extLst>
               <a:ext uri="{FF2B5EF4-FFF2-40B4-BE49-F238E27FC236}">
-                <a16:creationId xmlns:a16="http://schemas.microsoft.com/office/drawing/2014/main" id="{827D7488-B4AC-4BE5-BA99-AFD01D3D8B4D}"/>
+                <a16:creationId xmlns:a16="http://schemas.microsoft.com/office/drawing/2014/main" xmlns="" id="{827D7488-B4AC-4BE5-BA99-AFD01D3D8B4D}"/>
               </a:ext>
             </a:extLst>
           </p:cNvPr>
@@ -15591,7 +15591,7 @@
           <p:cNvPr id="3" name="Rectangle 1">
             <a:extLst>
               <a:ext uri="{FF2B5EF4-FFF2-40B4-BE49-F238E27FC236}">
-                <a16:creationId xmlns:a16="http://schemas.microsoft.com/office/drawing/2014/main" id="{08D55DE2-58D1-45FB-8721-9777487B8420}"/>
+                <a16:creationId xmlns:a16="http://schemas.microsoft.com/office/drawing/2014/main" xmlns="" id="{08D55DE2-58D1-45FB-8721-9777487B8420}"/>
               </a:ext>
             </a:extLst>
           </p:cNvPr>
@@ -15680,7 +15680,7 @@
           <p:cNvPr id="9" name="Rectangle 1">
             <a:extLst>
               <a:ext uri="{FF2B5EF4-FFF2-40B4-BE49-F238E27FC236}">
-                <a16:creationId xmlns:a16="http://schemas.microsoft.com/office/drawing/2014/main" id="{A68C7CDE-4209-421D-814E-AB48E60FD77D}"/>
+                <a16:creationId xmlns:a16="http://schemas.microsoft.com/office/drawing/2014/main" xmlns="" id="{A68C7CDE-4209-421D-814E-AB48E60FD77D}"/>
               </a:ext>
             </a:extLst>
           </p:cNvPr>
@@ -15769,7 +15769,7 @@
           <p:cNvPr id="10" name="Rectangle 2">
             <a:extLst>
               <a:ext uri="{FF2B5EF4-FFF2-40B4-BE49-F238E27FC236}">
-                <a16:creationId xmlns:a16="http://schemas.microsoft.com/office/drawing/2014/main" id="{1A8B725B-464A-4776-8F4B-5A31438C16BC}"/>
+                <a16:creationId xmlns:a16="http://schemas.microsoft.com/office/drawing/2014/main" xmlns="" id="{1A8B725B-464A-4776-8F4B-5A31438C16BC}"/>
               </a:ext>
             </a:extLst>
           </p:cNvPr>
@@ -16035,7 +16035,7 @@
               </a:rPr>
               <a:t>.**</a:t>
             </a:r>
-            <a:endParaRPr lang="ru-UA" altLang="en-US" sz="2400" i="1" dirty="0" smtClean="0">
+            <a:endParaRPr lang="aa-ET" altLang="en-US" sz="2400" i="1" dirty="0" smtClean="0">
               <a:latin typeface="Calibri" panose="020F0502020204030204" pitchFamily="34" charset="0"/>
             </a:endParaRPr>
           </a:p>
@@ -16177,7 +16177,7 @@
           <p:cNvPr id="2" name="Заголовок 1">
             <a:extLst>
               <a:ext uri="{FF2B5EF4-FFF2-40B4-BE49-F238E27FC236}">
-                <a16:creationId xmlns:a16="http://schemas.microsoft.com/office/drawing/2014/main" id="{2C13FF26-F891-42AE-A892-93985C6AC536}"/>
+                <a16:creationId xmlns:a16="http://schemas.microsoft.com/office/drawing/2014/main" xmlns="" id="{2C13FF26-F891-42AE-A892-93985C6AC536}"/>
               </a:ext>
             </a:extLst>
           </p:cNvPr>
@@ -16210,7 +16210,7 @@
           <p:cNvPr id="3" name="Місце для вмісту 2">
             <a:extLst>
               <a:ext uri="{FF2B5EF4-FFF2-40B4-BE49-F238E27FC236}">
-                <a16:creationId xmlns:a16="http://schemas.microsoft.com/office/drawing/2014/main" id="{AE270C6D-62D5-4CD6-84E0-A7F3C617A592}"/>
+                <a16:creationId xmlns:a16="http://schemas.microsoft.com/office/drawing/2014/main" xmlns="" id="{AE270C6D-62D5-4CD6-84E0-A7F3C617A592}"/>
               </a:ext>
             </a:extLst>
           </p:cNvPr>
@@ -16486,7 +16486,7 @@
           <p:cNvPr id="4" name="Rectangle 1">
             <a:extLst>
               <a:ext uri="{FF2B5EF4-FFF2-40B4-BE49-F238E27FC236}">
-                <a16:creationId xmlns:a16="http://schemas.microsoft.com/office/drawing/2014/main" id="{A34A229F-8A26-4FEE-8029-53F7F5A4AFDA}"/>
+                <a16:creationId xmlns:a16="http://schemas.microsoft.com/office/drawing/2014/main" xmlns="" id="{A34A229F-8A26-4FEE-8029-53F7F5A4AFDA}"/>
               </a:ext>
             </a:extLst>
           </p:cNvPr>
@@ -16575,7 +16575,7 @@
           <p:cNvPr id="5" name="Rectangle 2">
             <a:extLst>
               <a:ext uri="{FF2B5EF4-FFF2-40B4-BE49-F238E27FC236}">
-                <a16:creationId xmlns:a16="http://schemas.microsoft.com/office/drawing/2014/main" id="{56B627E6-BABF-4BC2-9AED-D1FE87BA64E9}"/>
+                <a16:creationId xmlns:a16="http://schemas.microsoft.com/office/drawing/2014/main" xmlns="" id="{56B627E6-BABF-4BC2-9AED-D1FE87BA64E9}"/>
               </a:ext>
             </a:extLst>
           </p:cNvPr>
@@ -16664,7 +16664,7 @@
           <p:cNvPr id="6" name="Rectangle 3">
             <a:extLst>
               <a:ext uri="{FF2B5EF4-FFF2-40B4-BE49-F238E27FC236}">
-                <a16:creationId xmlns:a16="http://schemas.microsoft.com/office/drawing/2014/main" id="{BE84B0EA-B423-4F49-917B-38DAFF806F4E}"/>
+                <a16:creationId xmlns:a16="http://schemas.microsoft.com/office/drawing/2014/main" xmlns="" id="{BE84B0EA-B423-4F49-917B-38DAFF806F4E}"/>
               </a:ext>
             </a:extLst>
           </p:cNvPr>
@@ -22893,31 +22893,25 @@
               <a:rPr lang="en-US" altLang="en-US" sz="2000" dirty="0" smtClean="0">
                 <a:latin typeface="Calibri (Body)"/>
               </a:rPr>
-              <a:t>Implement the program for change the input string register. Read string from command line </a:t>
+              <a:t>Implement the program for change the input string register. Read string from command line argument during </a:t>
+            </a:r>
+            <a:r>
+              <a:rPr lang="en-US" altLang="en-US" sz="2000" smtClean="0">
+                <a:latin typeface="Calibri (Body)"/>
+              </a:rPr>
+              <a:t>program </a:t>
+            </a:r>
+            <a:r>
+              <a:rPr lang="en-US" altLang="en-US" sz="2000" smtClean="0">
+                <a:latin typeface="Calibri (Body)"/>
+              </a:rPr>
+              <a:t>start-up </a:t>
             </a:r>
             <a:r>
               <a:rPr lang="en-US" altLang="en-US" sz="2000" dirty="0" smtClean="0">
                 <a:latin typeface="Calibri (Body)"/>
               </a:rPr>
-              <a:t>argument during program </a:t>
-            </a:r>
-            <a:r>
-              <a:rPr lang="en-US" altLang="en-US" sz="2000" dirty="0" err="1" smtClean="0">
-                <a:latin typeface="Calibri (Body)"/>
-              </a:rPr>
-              <a:t>srartup</a:t>
-            </a:r>
-            <a:r>
-              <a:rPr lang="en-US" altLang="en-US" sz="2000" smtClean="0">
-                <a:latin typeface="Calibri (Body)"/>
-              </a:rPr>
-              <a:t> and </a:t>
-            </a:r>
-            <a:r>
-              <a:rPr lang="en-US" altLang="en-US" sz="2000" dirty="0" smtClean="0">
-                <a:latin typeface="Calibri (Body)"/>
-              </a:rPr>
-              <a:t>do: </a:t>
+              <a:t>and do: </a:t>
             </a:r>
           </a:p>
           <a:p>
@@ -24379,7 +24373,7 @@
           <p:cNvPr id="4" name="Rectangle 1">
             <a:extLst>
               <a:ext uri="{FF2B5EF4-FFF2-40B4-BE49-F238E27FC236}">
-                <a16:creationId xmlns:a16="http://schemas.microsoft.com/office/drawing/2014/main" id="{9F88C462-7FB5-495A-A08E-BBB23A368CF4}"/>
+                <a16:creationId xmlns:a16="http://schemas.microsoft.com/office/drawing/2014/main" xmlns="" id="{9F88C462-7FB5-495A-A08E-BBB23A368CF4}"/>
               </a:ext>
             </a:extLst>
           </p:cNvPr>
@@ -24942,7 +24936,7 @@
           <p:cNvPr id="4" name="Rectangle 1">
             <a:extLst>
               <a:ext uri="{FF2B5EF4-FFF2-40B4-BE49-F238E27FC236}">
-                <a16:creationId xmlns:a16="http://schemas.microsoft.com/office/drawing/2014/main" id="{49FA7502-C7F3-4D88-90B1-11FA533A3F80}"/>
+                <a16:creationId xmlns:a16="http://schemas.microsoft.com/office/drawing/2014/main" xmlns="" id="{49FA7502-C7F3-4D88-90B1-11FA533A3F80}"/>
               </a:ext>
             </a:extLst>
           </p:cNvPr>
@@ -25031,7 +25025,7 @@
           <p:cNvPr id="5" name="Rectangle 1">
             <a:extLst>
               <a:ext uri="{FF2B5EF4-FFF2-40B4-BE49-F238E27FC236}">
-                <a16:creationId xmlns:a16="http://schemas.microsoft.com/office/drawing/2014/main" id="{C177939B-D70B-47A3-A4A9-6AF0F29F2F0B}"/>
+                <a16:creationId xmlns:a16="http://schemas.microsoft.com/office/drawing/2014/main" xmlns="" id="{C177939B-D70B-47A3-A4A9-6AF0F29F2F0B}"/>
               </a:ext>
             </a:extLst>
           </p:cNvPr>
@@ -25271,7 +25265,7 @@
               </a:rPr>
               <a:t>();</a:t>
             </a:r>
-            <a:endParaRPr lang="ru-UA" altLang="en-US" sz="1600" dirty="0" smtClean="0">
+            <a:endParaRPr lang="aa-ET" altLang="en-US" sz="1600" dirty="0" smtClean="0">
               <a:solidFill>
                 <a:srgbClr val="000000"/>
               </a:solidFill>
@@ -25313,7 +25307,7 @@
               <a:t>isBlank</a:t>
             </a:r>
             <a:r>
-              <a:rPr lang="ru-UA" altLang="en-US" sz="1600" dirty="0" smtClean="0">
+              <a:rPr lang="aa-ET" altLang="en-US" sz="1600" dirty="0" smtClean="0">
                 <a:solidFill>
                   <a:srgbClr val="000000"/>
                 </a:solidFill>
@@ -26200,7 +26194,7 @@
           <p:cNvPr id="4" name="Rectangle 1">
             <a:extLst>
               <a:ext uri="{FF2B5EF4-FFF2-40B4-BE49-F238E27FC236}">
-                <a16:creationId xmlns:a16="http://schemas.microsoft.com/office/drawing/2014/main" id="{49FA7502-C7F3-4D88-90B1-11FA533A3F80}"/>
+                <a16:creationId xmlns:a16="http://schemas.microsoft.com/office/drawing/2014/main" xmlns="" id="{49FA7502-C7F3-4D88-90B1-11FA533A3F80}"/>
               </a:ext>
             </a:extLst>
           </p:cNvPr>
@@ -26289,7 +26283,7 @@
           <p:cNvPr id="5" name="Rectangle 1">
             <a:extLst>
               <a:ext uri="{FF2B5EF4-FFF2-40B4-BE49-F238E27FC236}">
-                <a16:creationId xmlns:a16="http://schemas.microsoft.com/office/drawing/2014/main" id="{C177939B-D70B-47A3-A4A9-6AF0F29F2F0B}"/>
+                <a16:creationId xmlns:a16="http://schemas.microsoft.com/office/drawing/2014/main" xmlns="" id="{C177939B-D70B-47A3-A4A9-6AF0F29F2F0B}"/>
               </a:ext>
             </a:extLst>
           </p:cNvPr>
@@ -26378,7 +26372,7 @@
           <p:cNvPr id="6" name="Rectangle 1">
             <a:extLst>
               <a:ext uri="{FF2B5EF4-FFF2-40B4-BE49-F238E27FC236}">
-                <a16:creationId xmlns:a16="http://schemas.microsoft.com/office/drawing/2014/main" id="{7681AF85-EE99-42E3-9B45-F88BCD1E401F}"/>
+                <a16:creationId xmlns:a16="http://schemas.microsoft.com/office/drawing/2014/main" xmlns="" id="{7681AF85-EE99-42E3-9B45-F88BCD1E401F}"/>
               </a:ext>
             </a:extLst>
           </p:cNvPr>
@@ -27656,7 +27650,7 @@
           <p:cNvPr id="4" name="Rectangle 1">
             <a:extLst>
               <a:ext uri="{FF2B5EF4-FFF2-40B4-BE49-F238E27FC236}">
-                <a16:creationId xmlns:a16="http://schemas.microsoft.com/office/drawing/2014/main" id="{49FA7502-C7F3-4D88-90B1-11FA533A3F80}"/>
+                <a16:creationId xmlns:a16="http://schemas.microsoft.com/office/drawing/2014/main" xmlns="" id="{49FA7502-C7F3-4D88-90B1-11FA533A3F80}"/>
               </a:ext>
             </a:extLst>
           </p:cNvPr>
@@ -27745,7 +27739,7 @@
           <p:cNvPr id="5" name="Rectangle 1">
             <a:extLst>
               <a:ext uri="{FF2B5EF4-FFF2-40B4-BE49-F238E27FC236}">
-                <a16:creationId xmlns:a16="http://schemas.microsoft.com/office/drawing/2014/main" id="{C177939B-D70B-47A3-A4A9-6AF0F29F2F0B}"/>
+                <a16:creationId xmlns:a16="http://schemas.microsoft.com/office/drawing/2014/main" xmlns="" id="{C177939B-D70B-47A3-A4A9-6AF0F29F2F0B}"/>
               </a:ext>
             </a:extLst>
           </p:cNvPr>
@@ -27834,7 +27828,7 @@
           <p:cNvPr id="6" name="Rectangle 1">
             <a:extLst>
               <a:ext uri="{FF2B5EF4-FFF2-40B4-BE49-F238E27FC236}">
-                <a16:creationId xmlns:a16="http://schemas.microsoft.com/office/drawing/2014/main" id="{7681AF85-EE99-42E3-9B45-F88BCD1E401F}"/>
+                <a16:creationId xmlns:a16="http://schemas.microsoft.com/office/drawing/2014/main" xmlns="" id="{7681AF85-EE99-42E3-9B45-F88BCD1E401F}"/>
               </a:ext>
             </a:extLst>
           </p:cNvPr>
@@ -27923,7 +27917,7 @@
           <p:cNvPr id="7" name="Rectangle 1">
             <a:extLst>
               <a:ext uri="{FF2B5EF4-FFF2-40B4-BE49-F238E27FC236}">
-                <a16:creationId xmlns:a16="http://schemas.microsoft.com/office/drawing/2014/main" id="{5FFAA8C0-C8AD-4F0B-A1C7-F01A3053241E}"/>
+                <a16:creationId xmlns:a16="http://schemas.microsoft.com/office/drawing/2014/main" xmlns="" id="{5FFAA8C0-C8AD-4F0B-A1C7-F01A3053241E}"/>
               </a:ext>
             </a:extLst>
           </p:cNvPr>
@@ -28081,7 +28075,7 @@
           <p:cNvPr id="4" name="Rectangle 1">
             <a:extLst>
               <a:ext uri="{FF2B5EF4-FFF2-40B4-BE49-F238E27FC236}">
-                <a16:creationId xmlns:a16="http://schemas.microsoft.com/office/drawing/2014/main" id="{49FA7502-C7F3-4D88-90B1-11FA533A3F80}"/>
+                <a16:creationId xmlns:a16="http://schemas.microsoft.com/office/drawing/2014/main" xmlns="" id="{49FA7502-C7F3-4D88-90B1-11FA533A3F80}"/>
               </a:ext>
             </a:extLst>
           </p:cNvPr>
@@ -28170,7 +28164,7 @@
           <p:cNvPr id="5" name="Rectangle 1">
             <a:extLst>
               <a:ext uri="{FF2B5EF4-FFF2-40B4-BE49-F238E27FC236}">
-                <a16:creationId xmlns:a16="http://schemas.microsoft.com/office/drawing/2014/main" id="{C177939B-D70B-47A3-A4A9-6AF0F29F2F0B}"/>
+                <a16:creationId xmlns:a16="http://schemas.microsoft.com/office/drawing/2014/main" xmlns="" id="{C177939B-D70B-47A3-A4A9-6AF0F29F2F0B}"/>
               </a:ext>
             </a:extLst>
           </p:cNvPr>
@@ -28259,7 +28253,7 @@
           <p:cNvPr id="6" name="Rectangle 1">
             <a:extLst>
               <a:ext uri="{FF2B5EF4-FFF2-40B4-BE49-F238E27FC236}">
-                <a16:creationId xmlns:a16="http://schemas.microsoft.com/office/drawing/2014/main" id="{7681AF85-EE99-42E3-9B45-F88BCD1E401F}"/>
+                <a16:creationId xmlns:a16="http://schemas.microsoft.com/office/drawing/2014/main" xmlns="" id="{7681AF85-EE99-42E3-9B45-F88BCD1E401F}"/>
               </a:ext>
             </a:extLst>
           </p:cNvPr>
@@ -28348,7 +28342,7 @@
           <p:cNvPr id="16386" name="Picture 2" descr="Картинки по запросу string vs stringbuilder vs stringbuffer java">
             <a:extLst>
               <a:ext uri="{FF2B5EF4-FFF2-40B4-BE49-F238E27FC236}">
-                <a16:creationId xmlns:a16="http://schemas.microsoft.com/office/drawing/2014/main" id="{DD815080-F001-4623-9682-64E1BF9D2F13}"/>
+                <a16:creationId xmlns:a16="http://schemas.microsoft.com/office/drawing/2014/main" xmlns="" id="{DD815080-F001-4623-9682-64E1BF9D2F13}"/>
               </a:ext>
             </a:extLst>
           </p:cNvPr>
@@ -28464,7 +28458,7 @@
           <p:cNvPr id="4" name="Rectangle 1">
             <a:extLst>
               <a:ext uri="{FF2B5EF4-FFF2-40B4-BE49-F238E27FC236}">
-                <a16:creationId xmlns:a16="http://schemas.microsoft.com/office/drawing/2014/main" id="{49FA7502-C7F3-4D88-90B1-11FA533A3F80}"/>
+                <a16:creationId xmlns:a16="http://schemas.microsoft.com/office/drawing/2014/main" xmlns="" id="{49FA7502-C7F3-4D88-90B1-11FA533A3F80}"/>
               </a:ext>
             </a:extLst>
           </p:cNvPr>
@@ -28553,7 +28547,7 @@
           <p:cNvPr id="5" name="Rectangle 1">
             <a:extLst>
               <a:ext uri="{FF2B5EF4-FFF2-40B4-BE49-F238E27FC236}">
-                <a16:creationId xmlns:a16="http://schemas.microsoft.com/office/drawing/2014/main" id="{C177939B-D70B-47A3-A4A9-6AF0F29F2F0B}"/>
+                <a16:creationId xmlns:a16="http://schemas.microsoft.com/office/drawing/2014/main" xmlns="" id="{C177939B-D70B-47A3-A4A9-6AF0F29F2F0B}"/>
               </a:ext>
             </a:extLst>
           </p:cNvPr>
@@ -28642,7 +28636,7 @@
           <p:cNvPr id="6" name="Rectangle 1">
             <a:extLst>
               <a:ext uri="{FF2B5EF4-FFF2-40B4-BE49-F238E27FC236}">
-                <a16:creationId xmlns:a16="http://schemas.microsoft.com/office/drawing/2014/main" id="{7681AF85-EE99-42E3-9B45-F88BCD1E401F}"/>
+                <a16:creationId xmlns:a16="http://schemas.microsoft.com/office/drawing/2014/main" xmlns="" id="{7681AF85-EE99-42E3-9B45-F88BCD1E401F}"/>
               </a:ext>
             </a:extLst>
           </p:cNvPr>
@@ -28731,7 +28725,7 @@
           <p:cNvPr id="9" name="Таблиця 8">
             <a:extLst>
               <a:ext uri="{FF2B5EF4-FFF2-40B4-BE49-F238E27FC236}">
-                <a16:creationId xmlns:a16="http://schemas.microsoft.com/office/drawing/2014/main" id="{34AE852B-75AB-4692-BD18-44216962BC39}"/>
+                <a16:creationId xmlns:a16="http://schemas.microsoft.com/office/drawing/2014/main" xmlns="" id="{34AE852B-75AB-4692-BD18-44216962BC39}"/>
               </a:ext>
             </a:extLst>
           </p:cNvPr>
@@ -28760,28 +28754,28 @@
                 <a:gridCol w="2286000">
                   <a:extLst>
                     <a:ext uri="{9D8B030D-6E8A-4147-A177-3AD203B41FA5}">
-                      <a16:colId xmlns:a16="http://schemas.microsoft.com/office/drawing/2014/main" val="6845744"/>
+                      <a16:colId xmlns:a16="http://schemas.microsoft.com/office/drawing/2014/main" xmlns="" val="6845744"/>
                     </a:ext>
                   </a:extLst>
                 </a:gridCol>
                 <a:gridCol w="2286000">
                   <a:extLst>
                     <a:ext uri="{9D8B030D-6E8A-4147-A177-3AD203B41FA5}">
-                      <a16:colId xmlns:a16="http://schemas.microsoft.com/office/drawing/2014/main" val="3388244049"/>
+                      <a16:colId xmlns:a16="http://schemas.microsoft.com/office/drawing/2014/main" xmlns="" val="3388244049"/>
                     </a:ext>
                   </a:extLst>
                 </a:gridCol>
                 <a:gridCol w="2286000">
                   <a:extLst>
                     <a:ext uri="{9D8B030D-6E8A-4147-A177-3AD203B41FA5}">
-                      <a16:colId xmlns:a16="http://schemas.microsoft.com/office/drawing/2014/main" val="928790593"/>
+                      <a16:colId xmlns:a16="http://schemas.microsoft.com/office/drawing/2014/main" xmlns="" val="928790593"/>
                     </a:ext>
                   </a:extLst>
                 </a:gridCol>
                 <a:gridCol w="2286000">
                   <a:extLst>
                     <a:ext uri="{9D8B030D-6E8A-4147-A177-3AD203B41FA5}">
-                      <a16:colId xmlns:a16="http://schemas.microsoft.com/office/drawing/2014/main" val="2994235315"/>
+                      <a16:colId xmlns:a16="http://schemas.microsoft.com/office/drawing/2014/main" xmlns="" val="2994235315"/>
                     </a:ext>
                   </a:extLst>
                 </a:gridCol>
@@ -28873,7 +28867,7 @@
                 </a:tc>
                 <a:extLst>
                   <a:ext uri="{0D108BD9-81ED-4DB2-BD59-A6C34878D82A}">
-                    <a16:rowId xmlns:a16="http://schemas.microsoft.com/office/drawing/2014/main" val="1521795023"/>
+                    <a16:rowId xmlns:a16="http://schemas.microsoft.com/office/drawing/2014/main" xmlns="" val="1521795023"/>
                   </a:ext>
                 </a:extLst>
               </a:tr>
@@ -28944,7 +28938,7 @@
                 </a:tc>
                 <a:extLst>
                   <a:ext uri="{0D108BD9-81ED-4DB2-BD59-A6C34878D82A}">
-                    <a16:rowId xmlns:a16="http://schemas.microsoft.com/office/drawing/2014/main" val="3279341362"/>
+                    <a16:rowId xmlns:a16="http://schemas.microsoft.com/office/drawing/2014/main" xmlns="" val="3279341362"/>
                   </a:ext>
                 </a:extLst>
               </a:tr>
@@ -29042,7 +29036,7 @@
                 </a:tc>
                 <a:extLst>
                   <a:ext uri="{0D108BD9-81ED-4DB2-BD59-A6C34878D82A}">
-                    <a16:rowId xmlns:a16="http://schemas.microsoft.com/office/drawing/2014/main" val="3582882400"/>
+                    <a16:rowId xmlns:a16="http://schemas.microsoft.com/office/drawing/2014/main" xmlns="" val="3582882400"/>
                   </a:ext>
                 </a:extLst>
               </a:tr>
@@ -29127,7 +29121,7 @@
                 </a:tc>
                 <a:extLst>
                   <a:ext uri="{0D108BD9-81ED-4DB2-BD59-A6C34878D82A}">
-                    <a16:rowId xmlns:a16="http://schemas.microsoft.com/office/drawing/2014/main" val="683457254"/>
+                    <a16:rowId xmlns:a16="http://schemas.microsoft.com/office/drawing/2014/main" xmlns="" val="683457254"/>
                   </a:ext>
                 </a:extLst>
               </a:tr>
@@ -29258,7 +29252,7 @@
                 </a:tc>
                 <a:extLst>
                   <a:ext uri="{0D108BD9-81ED-4DB2-BD59-A6C34878D82A}">
-                    <a16:rowId xmlns:a16="http://schemas.microsoft.com/office/drawing/2014/main" val="1969611214"/>
+                    <a16:rowId xmlns:a16="http://schemas.microsoft.com/office/drawing/2014/main" xmlns="" val="1969611214"/>
                   </a:ext>
                 </a:extLst>
               </a:tr>
@@ -29357,7 +29351,7 @@
                 </a:tc>
                 <a:extLst>
                   <a:ext uri="{0D108BD9-81ED-4DB2-BD59-A6C34878D82A}">
-                    <a16:rowId xmlns:a16="http://schemas.microsoft.com/office/drawing/2014/main" val="1684209653"/>
+                    <a16:rowId xmlns:a16="http://schemas.microsoft.com/office/drawing/2014/main" xmlns="" val="1684209653"/>
                   </a:ext>
                 </a:extLst>
               </a:tr>
@@ -29424,7 +29418,7 @@
                 </a:tc>
                 <a:extLst>
                   <a:ext uri="{0D108BD9-81ED-4DB2-BD59-A6C34878D82A}">
-                    <a16:rowId xmlns:a16="http://schemas.microsoft.com/office/drawing/2014/main" val="199399117"/>
+                    <a16:rowId xmlns:a16="http://schemas.microsoft.com/office/drawing/2014/main" xmlns="" val="199399117"/>
                   </a:ext>
                 </a:extLst>
               </a:tr>

</xml_diff>

<commit_message>
L02 Add missed Optional class methods
</commit_message>
<xml_diff>
--- a/Lectures/Lesson 02 - Built-In Classes.pptx
+++ b/Lectures/Lesson 02 - Built-In Classes.pptx
@@ -33,7 +33,7 @@
     <p:sldId id="281" r:id="rId24"/>
     <p:sldId id="283" r:id="rId25"/>
     <p:sldId id="284" r:id="rId26"/>
-    <p:sldId id="285" r:id="rId27"/>
+    <p:sldId id="297" r:id="rId27"/>
     <p:sldId id="286" r:id="rId28"/>
     <p:sldId id="288" r:id="rId29"/>
     <p:sldId id="289" r:id="rId30"/>
@@ -231,7 +231,7 @@
           <a:p>
             <a:fld id="{E02A8A83-6CB5-4597-88C8-473182A1D80C}" type="datetimeFigureOut">
               <a:rPr lang="en-US" smtClean="0"/>
-              <a:t>30-Oct-18</a:t>
+              <a:t>12/9/2018</a:t>
             </a:fld>
             <a:endParaRPr lang="en-US"/>
           </a:p>
@@ -389,7 +389,7 @@
           <a:p>
             <a:fld id="{A2894658-6FB3-43D6-804A-F306B9C561BF}" type="slidenum">
               <a:rPr lang="en-US" smtClean="0"/>
-              <a:t>‹№›</a:t>
+              <a:t>‹#›</a:t>
             </a:fld>
             <a:endParaRPr lang="en-US"/>
           </a:p>
@@ -3212,7 +3212,7 @@
           <a:p>
             <a:fld id="{EEB28C23-52B7-4DED-9EA2-9F92B91AC614}" type="datetimeFigureOut">
               <a:rPr lang="en-US" smtClean="0"/>
-              <a:t>30-Oct-18</a:t>
+              <a:t>12/9/2018</a:t>
             </a:fld>
             <a:endParaRPr lang="en-US"/>
           </a:p>
@@ -3254,7 +3254,7 @@
           <a:p>
             <a:fld id="{FD3F9752-28EF-4474-AF58-DD23A8EE3509}" type="slidenum">
               <a:rPr lang="en-US" smtClean="0"/>
-              <a:t>‹№›</a:t>
+              <a:t>‹#›</a:t>
             </a:fld>
             <a:endParaRPr lang="en-US"/>
           </a:p>
@@ -3380,7 +3380,7 @@
           <a:p>
             <a:fld id="{EEB28C23-52B7-4DED-9EA2-9F92B91AC614}" type="datetimeFigureOut">
               <a:rPr lang="en-US" smtClean="0"/>
-              <a:t>30-Oct-18</a:t>
+              <a:t>12/9/2018</a:t>
             </a:fld>
             <a:endParaRPr lang="en-US"/>
           </a:p>
@@ -3422,7 +3422,7 @@
           <a:p>
             <a:fld id="{FD3F9752-28EF-4474-AF58-DD23A8EE3509}" type="slidenum">
               <a:rPr lang="en-US" smtClean="0"/>
-              <a:t>‹№›</a:t>
+              <a:t>‹#›</a:t>
             </a:fld>
             <a:endParaRPr lang="en-US"/>
           </a:p>
@@ -3558,7 +3558,7 @@
           <a:p>
             <a:fld id="{EEB28C23-52B7-4DED-9EA2-9F92B91AC614}" type="datetimeFigureOut">
               <a:rPr lang="en-US" smtClean="0"/>
-              <a:t>30-Oct-18</a:t>
+              <a:t>12/9/2018</a:t>
             </a:fld>
             <a:endParaRPr lang="en-US"/>
           </a:p>
@@ -3600,7 +3600,7 @@
           <a:p>
             <a:fld id="{FD3F9752-28EF-4474-AF58-DD23A8EE3509}" type="slidenum">
               <a:rPr lang="en-US" smtClean="0"/>
-              <a:t>‹№›</a:t>
+              <a:t>‹#›</a:t>
             </a:fld>
             <a:endParaRPr lang="en-US"/>
           </a:p>
@@ -3726,7 +3726,7 @@
           <a:p>
             <a:fld id="{EEB28C23-52B7-4DED-9EA2-9F92B91AC614}" type="datetimeFigureOut">
               <a:rPr lang="en-US" smtClean="0"/>
-              <a:t>30-Oct-18</a:t>
+              <a:t>12/9/2018</a:t>
             </a:fld>
             <a:endParaRPr lang="en-US"/>
           </a:p>
@@ -3768,7 +3768,7 @@
           <a:p>
             <a:fld id="{FD3F9752-28EF-4474-AF58-DD23A8EE3509}" type="slidenum">
               <a:rPr lang="en-US" smtClean="0"/>
-              <a:t>‹№›</a:t>
+              <a:t>‹#›</a:t>
             </a:fld>
             <a:endParaRPr lang="en-US"/>
           </a:p>
@@ -3971,7 +3971,7 @@
           <a:p>
             <a:fld id="{EEB28C23-52B7-4DED-9EA2-9F92B91AC614}" type="datetimeFigureOut">
               <a:rPr lang="en-US" smtClean="0"/>
-              <a:t>30-Oct-18</a:t>
+              <a:t>12/9/2018</a:t>
             </a:fld>
             <a:endParaRPr lang="en-US"/>
           </a:p>
@@ -4013,7 +4013,7 @@
           <a:p>
             <a:fld id="{FD3F9752-28EF-4474-AF58-DD23A8EE3509}" type="slidenum">
               <a:rPr lang="en-US" smtClean="0"/>
-              <a:t>‹№›</a:t>
+              <a:t>‹#›</a:t>
             </a:fld>
             <a:endParaRPr lang="en-US"/>
           </a:p>
@@ -4200,7 +4200,7 @@
           <a:p>
             <a:fld id="{EEB28C23-52B7-4DED-9EA2-9F92B91AC614}" type="datetimeFigureOut">
               <a:rPr lang="en-US" smtClean="0"/>
-              <a:t>30-Oct-18</a:t>
+              <a:t>12/9/2018</a:t>
             </a:fld>
             <a:endParaRPr lang="en-US"/>
           </a:p>
@@ -4242,7 +4242,7 @@
           <a:p>
             <a:fld id="{FD3F9752-28EF-4474-AF58-DD23A8EE3509}" type="slidenum">
               <a:rPr lang="en-US" smtClean="0"/>
-              <a:t>‹№›</a:t>
+              <a:t>‹#›</a:t>
             </a:fld>
             <a:endParaRPr lang="en-US"/>
           </a:p>
@@ -4564,7 +4564,7 @@
           <a:p>
             <a:fld id="{EEB28C23-52B7-4DED-9EA2-9F92B91AC614}" type="datetimeFigureOut">
               <a:rPr lang="en-US" smtClean="0"/>
-              <a:t>30-Oct-18</a:t>
+              <a:t>12/9/2018</a:t>
             </a:fld>
             <a:endParaRPr lang="en-US"/>
           </a:p>
@@ -4606,7 +4606,7 @@
           <a:p>
             <a:fld id="{FD3F9752-28EF-4474-AF58-DD23A8EE3509}" type="slidenum">
               <a:rPr lang="en-US" smtClean="0"/>
-              <a:t>‹№›</a:t>
+              <a:t>‹#›</a:t>
             </a:fld>
             <a:endParaRPr lang="en-US"/>
           </a:p>
@@ -4681,7 +4681,7 @@
           <a:p>
             <a:fld id="{EEB28C23-52B7-4DED-9EA2-9F92B91AC614}" type="datetimeFigureOut">
               <a:rPr lang="en-US" smtClean="0"/>
-              <a:t>30-Oct-18</a:t>
+              <a:t>12/9/2018</a:t>
             </a:fld>
             <a:endParaRPr lang="en-US"/>
           </a:p>
@@ -4723,7 +4723,7 @@
           <a:p>
             <a:fld id="{FD3F9752-28EF-4474-AF58-DD23A8EE3509}" type="slidenum">
               <a:rPr lang="en-US" smtClean="0"/>
-              <a:t>‹№›</a:t>
+              <a:t>‹#›</a:t>
             </a:fld>
             <a:endParaRPr lang="en-US"/>
           </a:p>
@@ -4776,7 +4776,7 @@
           <a:p>
             <a:fld id="{EEB28C23-52B7-4DED-9EA2-9F92B91AC614}" type="datetimeFigureOut">
               <a:rPr lang="en-US" smtClean="0"/>
-              <a:t>30-Oct-18</a:t>
+              <a:t>12/9/2018</a:t>
             </a:fld>
             <a:endParaRPr lang="en-US"/>
           </a:p>
@@ -4818,7 +4818,7 @@
           <a:p>
             <a:fld id="{FD3F9752-28EF-4474-AF58-DD23A8EE3509}" type="slidenum">
               <a:rPr lang="en-US" smtClean="0"/>
-              <a:t>‹№›</a:t>
+              <a:t>‹#›</a:t>
             </a:fld>
             <a:endParaRPr lang="en-US"/>
           </a:p>
@@ -5051,7 +5051,7 @@
           <a:p>
             <a:fld id="{EEB28C23-52B7-4DED-9EA2-9F92B91AC614}" type="datetimeFigureOut">
               <a:rPr lang="en-US" smtClean="0"/>
-              <a:t>30-Oct-18</a:t>
+              <a:t>12/9/2018</a:t>
             </a:fld>
             <a:endParaRPr lang="en-US"/>
           </a:p>
@@ -5093,7 +5093,7 @@
           <a:p>
             <a:fld id="{FD3F9752-28EF-4474-AF58-DD23A8EE3509}" type="slidenum">
               <a:rPr lang="en-US" smtClean="0"/>
-              <a:t>‹№›</a:t>
+              <a:t>‹#›</a:t>
             </a:fld>
             <a:endParaRPr lang="en-US"/>
           </a:p>
@@ -5303,7 +5303,7 @@
           <a:p>
             <a:fld id="{EEB28C23-52B7-4DED-9EA2-9F92B91AC614}" type="datetimeFigureOut">
               <a:rPr lang="en-US" smtClean="0"/>
-              <a:t>30-Oct-18</a:t>
+              <a:t>12/9/2018</a:t>
             </a:fld>
             <a:endParaRPr lang="en-US"/>
           </a:p>
@@ -5345,7 +5345,7 @@
           <a:p>
             <a:fld id="{FD3F9752-28EF-4474-AF58-DD23A8EE3509}" type="slidenum">
               <a:rPr lang="en-US" smtClean="0"/>
-              <a:t>‹№›</a:t>
+              <a:t>‹#›</a:t>
             </a:fld>
             <a:endParaRPr lang="en-US"/>
           </a:p>
@@ -5514,7 +5514,7 @@
           <a:p>
             <a:fld id="{EEB28C23-52B7-4DED-9EA2-9F92B91AC614}" type="datetimeFigureOut">
               <a:rPr lang="en-US" smtClean="0"/>
-              <a:t>30-Oct-18</a:t>
+              <a:t>12/9/2018</a:t>
             </a:fld>
             <a:endParaRPr lang="en-US"/>
           </a:p>
@@ -5592,7 +5592,7 @@
           <a:p>
             <a:fld id="{FD3F9752-28EF-4474-AF58-DD23A8EE3509}" type="slidenum">
               <a:rPr lang="en-US" smtClean="0"/>
-              <a:t>‹№›</a:t>
+              <a:t>‹#›</a:t>
             </a:fld>
             <a:endParaRPr lang="en-US"/>
           </a:p>
@@ -7267,6 +7267,16 @@
                 <a:cs typeface="Courier New" panose="02070309020205020404" pitchFamily="49" charset="0"/>
               </a:rPr>
             </a:br>
+            <a:r>
+              <a:rPr lang="en-US" altLang="en-US" dirty="0">
+                <a:solidFill>
+                  <a:srgbClr val="000000"/>
+                </a:solidFill>
+                <a:latin typeface="Courier New" panose="02070309020205020404" pitchFamily="49" charset="0"/>
+                <a:cs typeface="Courier New" panose="02070309020205020404" pitchFamily="49" charset="0"/>
+              </a:rPr>
+              <a:t/>
+            </a:r>
             <a:br>
               <a:rPr lang="en-US" altLang="en-US" dirty="0">
                 <a:solidFill>
@@ -8243,6 +8253,16 @@
                 <a:cs typeface="Courier New" panose="02070309020205020404" pitchFamily="49" charset="0"/>
               </a:rPr>
             </a:br>
+            <a:r>
+              <a:rPr lang="en-US" altLang="en-US" sz="1700" dirty="0">
+                <a:solidFill>
+                  <a:srgbClr val="000000"/>
+                </a:solidFill>
+                <a:latin typeface="Courier New" panose="02070309020205020404" pitchFamily="49" charset="0"/>
+                <a:cs typeface="Courier New" panose="02070309020205020404" pitchFamily="49" charset="0"/>
+              </a:rPr>
+              <a:t/>
+            </a:r>
             <a:br>
               <a:rPr lang="en-US" altLang="en-US" sz="1700" dirty="0">
                 <a:solidFill>
@@ -9141,6 +9161,16 @@
                 <a:cs typeface="Courier New" panose="02070309020205020404" pitchFamily="49" charset="0"/>
               </a:rPr>
             </a:br>
+            <a:r>
+              <a:rPr lang="en-US" altLang="en-US" sz="1200" dirty="0">
+                <a:solidFill>
+                  <a:srgbClr val="000000"/>
+                </a:solidFill>
+                <a:latin typeface="Courier New" panose="02070309020205020404" pitchFamily="49" charset="0"/>
+                <a:cs typeface="Courier New" panose="02070309020205020404" pitchFamily="49" charset="0"/>
+              </a:rPr>
+              <a:t/>
+            </a:r>
             <a:br>
               <a:rPr lang="en-US" altLang="en-US" sz="1200" dirty="0">
                 <a:solidFill>
@@ -9384,6 +9414,16 @@
                 <a:cs typeface="Courier New" panose="02070309020205020404" pitchFamily="49" charset="0"/>
               </a:rPr>
             </a:br>
+            <a:r>
+              <a:rPr lang="en-US" altLang="en-US" sz="1200" dirty="0">
+                <a:solidFill>
+                  <a:srgbClr val="000000"/>
+                </a:solidFill>
+                <a:latin typeface="Courier New" panose="02070309020205020404" pitchFamily="49" charset="0"/>
+                <a:cs typeface="Courier New" panose="02070309020205020404" pitchFamily="49" charset="0"/>
+              </a:rPr>
+              <a:t/>
+            </a:r>
             <a:br>
               <a:rPr lang="en-US" altLang="en-US" sz="1200" dirty="0">
                 <a:solidFill>
@@ -9393,6 +9433,16 @@
                 <a:cs typeface="Courier New" panose="02070309020205020404" pitchFamily="49" charset="0"/>
               </a:rPr>
             </a:br>
+            <a:r>
+              <a:rPr lang="en-US" altLang="en-US" sz="1200" dirty="0">
+                <a:solidFill>
+                  <a:srgbClr val="000000"/>
+                </a:solidFill>
+                <a:latin typeface="Courier New" panose="02070309020205020404" pitchFamily="49" charset="0"/>
+                <a:cs typeface="Courier New" panose="02070309020205020404" pitchFamily="49" charset="0"/>
+              </a:rPr>
+              <a:t/>
+            </a:r>
             <a:br>
               <a:rPr lang="en-US" altLang="en-US" sz="1200" dirty="0">
                 <a:solidFill>
@@ -10242,6 +10292,20 @@
               </a:rPr>
               <a:t>//1</a:t>
             </a:r>
+            <a:r>
+              <a:rPr kumimoji="0" lang="en-US" altLang="en-US" sz="1200" b="0" i="0" u="none" strike="noStrike" cap="none" normalizeH="0" baseline="0" dirty="0">
+                <a:ln>
+                  <a:noFill/>
+                </a:ln>
+                <a:solidFill>
+                  <a:srgbClr val="000000"/>
+                </a:solidFill>
+                <a:effectLst/>
+                <a:latin typeface="Courier New" panose="02070309020205020404" pitchFamily="49" charset="0"/>
+                <a:cs typeface="Courier New" panose="02070309020205020404" pitchFamily="49" charset="0"/>
+              </a:rPr>
+              <a:t/>
+            </a:r>
             <a:br>
               <a:rPr kumimoji="0" lang="en-US" altLang="en-US" sz="1200" b="0" i="0" u="none" strike="noStrike" cap="none" normalizeH="0" baseline="0" dirty="0">
                 <a:ln>
@@ -10515,6 +10579,20 @@
               </a:rPr>
               <a:t>//2</a:t>
             </a:r>
+            <a:r>
+              <a:rPr kumimoji="0" lang="en-US" altLang="en-US" sz="1200" b="0" i="1" u="none" strike="noStrike" cap="none" normalizeH="0" baseline="0" dirty="0">
+                <a:ln>
+                  <a:noFill/>
+                </a:ln>
+                <a:solidFill>
+                  <a:srgbClr val="808080"/>
+                </a:solidFill>
+                <a:effectLst/>
+                <a:latin typeface="Courier New" panose="02070309020205020404" pitchFamily="49" charset="0"/>
+                <a:cs typeface="Courier New" panose="02070309020205020404" pitchFamily="49" charset="0"/>
+              </a:rPr>
+              <a:t/>
+            </a:r>
             <a:br>
               <a:rPr kumimoji="0" lang="en-US" altLang="en-US" sz="1200" b="0" i="1" u="none" strike="noStrike" cap="none" normalizeH="0" baseline="0" dirty="0">
                 <a:ln>
@@ -10721,6 +10799,20 @@
                 <a:cs typeface="Courier New" panose="02070309020205020404" pitchFamily="49" charset="0"/>
               </a:rPr>
               <a:t>ClassCastException</a:t>
+            </a:r>
+            <a:r>
+              <a:rPr kumimoji="0" lang="en-US" altLang="en-US" sz="1200" b="0" i="1" u="none" strike="noStrike" cap="none" normalizeH="0" baseline="0" dirty="0">
+                <a:ln>
+                  <a:noFill/>
+                </a:ln>
+                <a:solidFill>
+                  <a:srgbClr val="808080"/>
+                </a:solidFill>
+                <a:effectLst/>
+                <a:latin typeface="Courier New" panose="02070309020205020404" pitchFamily="49" charset="0"/>
+                <a:cs typeface="Courier New" panose="02070309020205020404" pitchFamily="49" charset="0"/>
+              </a:rPr>
+              <a:t/>
             </a:r>
             <a:br>
               <a:rPr kumimoji="0" lang="en-US" altLang="en-US" sz="1200" b="0" i="1" u="none" strike="noStrike" cap="none" normalizeH="0" baseline="0" dirty="0">
@@ -10773,6 +10865,20 @@
                 <a:cs typeface="Courier New" panose="02070309020205020404" pitchFamily="49" charset="0"/>
               </a:rPr>
               <a:t>//3</a:t>
+            </a:r>
+            <a:r>
+              <a:rPr kumimoji="0" lang="en-US" altLang="en-US" sz="1200" b="0" i="1" u="none" strike="noStrike" cap="none" normalizeH="0" baseline="0" dirty="0">
+                <a:ln>
+                  <a:noFill/>
+                </a:ln>
+                <a:solidFill>
+                  <a:srgbClr val="808080"/>
+                </a:solidFill>
+                <a:effectLst/>
+                <a:latin typeface="Courier New" panose="02070309020205020404" pitchFamily="49" charset="0"/>
+                <a:cs typeface="Courier New" panose="02070309020205020404" pitchFamily="49" charset="0"/>
+              </a:rPr>
+              <a:t/>
             </a:r>
             <a:br>
               <a:rPr kumimoji="0" lang="en-US" altLang="en-US" sz="1200" b="0" i="1" u="none" strike="noStrike" cap="none" normalizeH="0" baseline="0" dirty="0">
@@ -11208,6 +11314,16 @@
                 <a:cs typeface="Courier New" panose="02070309020205020404" pitchFamily="49" charset="0"/>
               </a:rPr>
             </a:br>
+            <a:r>
+              <a:rPr lang="en-US" altLang="en-US" sz="2000" i="1" dirty="0">
+                <a:solidFill>
+                  <a:srgbClr val="808080"/>
+                </a:solidFill>
+                <a:latin typeface="Courier New" panose="02070309020205020404" pitchFamily="49" charset="0"/>
+                <a:cs typeface="Courier New" panose="02070309020205020404" pitchFamily="49" charset="0"/>
+              </a:rPr>
+              <a:t/>
+            </a:r>
             <a:br>
               <a:rPr lang="en-US" altLang="en-US" sz="2000" i="1" dirty="0">
                 <a:solidFill>
@@ -11474,6 +11590,16 @@
                 <a:cs typeface="Courier New" panose="02070309020205020404" pitchFamily="49" charset="0"/>
               </a:rPr>
             </a:br>
+            <a:r>
+              <a:rPr lang="en-US" altLang="en-US" sz="2000" i="1" dirty="0">
+                <a:solidFill>
+                  <a:srgbClr val="808080"/>
+                </a:solidFill>
+                <a:latin typeface="Courier New" panose="02070309020205020404" pitchFamily="49" charset="0"/>
+                <a:cs typeface="Courier New" panose="02070309020205020404" pitchFamily="49" charset="0"/>
+              </a:rPr>
+              <a:t/>
+            </a:r>
             <a:br>
               <a:rPr lang="en-US" altLang="en-US" sz="2000" i="1" dirty="0">
                 <a:solidFill>
@@ -16087,6 +16213,16 @@
             <a:pPr marL="0" indent="0">
               <a:buNone/>
             </a:pPr>
+            <a:r>
+              <a:rPr lang="en-US" altLang="en-US" sz="2400" dirty="0">
+                <a:solidFill>
+                  <a:srgbClr val="000000"/>
+                </a:solidFill>
+                <a:latin typeface="Courier New" panose="02070309020205020404" pitchFamily="49" charset="0"/>
+                <a:cs typeface="Courier New" panose="02070309020205020404" pitchFamily="49" charset="0"/>
+              </a:rPr>
+              <a:t/>
+            </a:r>
             <a:br>
               <a:rPr lang="en-US" altLang="en-US" sz="2400" dirty="0">
                 <a:solidFill>
@@ -16928,20 +17064,10 @@
               <a:t>Optional.empty</a:t>
             </a:r>
             <a:r>
-              <a:rPr lang="en-US" dirty="0"/>
+              <a:rPr lang="en-US" dirty="0" smtClean="0"/>
               <a:t>()</a:t>
             </a:r>
-          </a:p>
-          <a:p>
-            <a:pPr>
-              <a:lnSpc>
-                <a:spcPct val="150000"/>
-              </a:lnSpc>
-            </a:pPr>
-            <a:r>
-              <a:rPr lang="en-US" dirty="0"/>
-              <a:t>From stream terminal operation</a:t>
-            </a:r>
+            <a:endParaRPr lang="en-US" dirty="0"/>
           </a:p>
         </p:txBody>
       </p:sp>
@@ -17539,42 +17665,1673 @@
           </a:p>
         </p:txBody>
       </p:sp>
-      <p:pic>
-        <p:nvPicPr>
-          <p:cNvPr id="4" name="Shape 138" descr="p16_4_1.gif"/>
-          <p:cNvPicPr preferRelativeResize="0">
-            <a:picLocks noGrp="1"/>
-          </p:cNvPicPr>
-          <p:nvPr>
-            <p:ph idx="1"/>
-          </p:nvPr>
-        </p:nvPicPr>
-        <p:blipFill>
-          <a:blip r:embed="rId2">
-            <a:alphaModFix/>
-          </a:blip>
-          <a:stretch>
-            <a:fillRect/>
-          </a:stretch>
-        </p:blipFill>
-        <p:spPr>
+      <p:sp>
+        <p:nvSpPr>
+          <p:cNvPr id="6" name="Rectangle 2"/>
+          <p:cNvSpPr>
+            <a:spLocks noChangeArrowheads="1"/>
+          </p:cNvSpPr>
+          <p:nvPr/>
+        </p:nvSpPr>
+        <p:spPr bwMode="auto">
           <a:xfrm>
-            <a:off x="1488152" y="1886465"/>
-            <a:ext cx="9215696" cy="4580237"/>
+            <a:off x="0" y="43934"/>
+            <a:ext cx="184731" cy="369332"/>
           </a:xfrm>
           <a:prstGeom prst="rect">
             <a:avLst/>
           </a:prstGeom>
-          <a:noFill/>
+          <a:solidFill>
+            <a:srgbClr val="FFFFFF"/>
+          </a:solidFill>
           <a:ln>
             <a:noFill/>
           </a:ln>
+          <a:effectLst/>
+          <a:extLst>
+            <a:ext uri="{91240B29-F687-4F45-9708-019B960494DF}">
+              <a14:hiddenLine xmlns:a14="http://schemas.microsoft.com/office/drawing/2010/main" w="9525">
+                <a:solidFill>
+                  <a:schemeClr val="tx1"/>
+                </a:solidFill>
+                <a:miter lim="800000"/>
+                <a:headEnd/>
+                <a:tailEnd/>
+              </a14:hiddenLine>
+            </a:ext>
+            <a:ext uri="{AF507438-7753-43E0-B8FC-AC1667EBCBE1}">
+              <a14:hiddenEffects xmlns:a14="http://schemas.microsoft.com/office/drawing/2010/main">
+                <a:effectLst>
+                  <a:outerShdw dist="35921" dir="2700000" algn="ctr" rotWithShape="0">
+                    <a:schemeClr val="bg2"/>
+                  </a:outerShdw>
+                </a:effectLst>
+              </a14:hiddenEffects>
+            </a:ext>
+          </a:extLst>
         </p:spPr>
-      </p:pic>
+        <p:txBody>
+          <a:bodyPr vert="horz" wrap="none" lIns="91440" tIns="45720" rIns="91440" bIns="45720" numCol="1" anchor="ctr" anchorCtr="0" compatLnSpc="1">
+            <a:prstTxWarp prst="textNoShape">
+              <a:avLst/>
+            </a:prstTxWarp>
+            <a:spAutoFit/>
+          </a:bodyPr>
+          <a:lstStyle/>
+          <a:p>
+            <a:pPr marL="0" marR="0" lvl="0" indent="0" algn="l" defTabSz="914400" rtl="0" eaLnBrk="0" fontAlgn="base" latinLnBrk="0" hangingPunct="0">
+              <a:lnSpc>
+                <a:spcPct val="100000"/>
+              </a:lnSpc>
+              <a:spcBef>
+                <a:spcPct val="0"/>
+              </a:spcBef>
+              <a:spcAft>
+                <a:spcPct val="0"/>
+              </a:spcAft>
+              <a:buClrTx/>
+              <a:buSzTx/>
+              <a:buFontTx/>
+              <a:buNone/>
+              <a:tabLst/>
+            </a:pPr>
+            <a:endParaRPr kumimoji="0" lang="en-US" altLang="en-US" sz="1800" b="0" i="0" u="none" strike="noStrike" cap="none" normalizeH="0" baseline="0" dirty="0" smtClean="0">
+              <a:ln>
+                <a:noFill/>
+              </a:ln>
+              <a:solidFill>
+                <a:schemeClr val="tx1"/>
+              </a:solidFill>
+              <a:effectLst/>
+              <a:latin typeface="Arial" panose="020B0604020202020204" pitchFamily="34" charset="0"/>
+            </a:endParaRPr>
+          </a:p>
+        </p:txBody>
+      </p:sp>
+      <p:sp>
+        <p:nvSpPr>
+          <p:cNvPr id="7" name="Rectangle 3"/>
+          <p:cNvSpPr>
+            <a:spLocks noGrp="1" noChangeArrowheads="1"/>
+          </p:cNvSpPr>
+          <p:nvPr>
+            <p:ph idx="1"/>
+          </p:nvPr>
+        </p:nvSpPr>
+        <p:spPr bwMode="auto">
+          <a:xfrm>
+            <a:off x="838200" y="1626631"/>
+            <a:ext cx="10799751" cy="5231369"/>
+          </a:xfrm>
+          <a:prstGeom prst="rect">
+            <a:avLst/>
+          </a:prstGeom>
+          <a:solidFill>
+            <a:srgbClr val="FFFFFF"/>
+          </a:solidFill>
+          <a:ln>
+            <a:noFill/>
+          </a:ln>
+          <a:effectLst/>
+          <a:extLst>
+            <a:ext uri="{91240B29-F687-4F45-9708-019B960494DF}">
+              <a14:hiddenLine xmlns:a14="http://schemas.microsoft.com/office/drawing/2010/main" w="9525">
+                <a:solidFill>
+                  <a:schemeClr val="tx1"/>
+                </a:solidFill>
+                <a:miter lim="800000"/>
+                <a:headEnd/>
+                <a:tailEnd/>
+              </a14:hiddenLine>
+            </a:ext>
+            <a:ext uri="{AF507438-7753-43E0-B8FC-AC1667EBCBE1}">
+              <a14:hiddenEffects xmlns:a14="http://schemas.microsoft.com/office/drawing/2010/main">
+                <a:effectLst>
+                  <a:outerShdw dist="35921" dir="2700000" algn="ctr" rotWithShape="0">
+                    <a:schemeClr val="bg2"/>
+                  </a:outerShdw>
+                </a:effectLst>
+              </a14:hiddenEffects>
+            </a:ext>
+          </a:extLst>
+        </p:spPr>
+        <p:txBody>
+          <a:bodyPr vert="horz" wrap="none" lIns="91440" tIns="45720" rIns="91440" bIns="45720" numCol="1" anchor="ctr" anchorCtr="0" compatLnSpc="1">
+            <a:prstTxWarp prst="textNoShape">
+              <a:avLst/>
+            </a:prstTxWarp>
+            <a:spAutoFit/>
+          </a:bodyPr>
+          <a:lstStyle/>
+          <a:p>
+            <a:pPr marL="0" indent="0" eaLnBrk="0" fontAlgn="base" hangingPunct="0">
+              <a:lnSpc>
+                <a:spcPct val="150000"/>
+              </a:lnSpc>
+              <a:spcBef>
+                <a:spcPct val="0"/>
+              </a:spcBef>
+              <a:spcAft>
+                <a:spcPct val="0"/>
+              </a:spcAft>
+              <a:buNone/>
+            </a:pPr>
+            <a:r>
+              <a:rPr kumimoji="0" lang="en-US" altLang="en-US" sz="1600" b="0" i="0" u="none" strike="noStrike" cap="none" normalizeH="0" baseline="0" dirty="0" smtClean="0">
+                <a:ln>
+                  <a:noFill/>
+                </a:ln>
+                <a:solidFill>
+                  <a:srgbClr val="20999D"/>
+                </a:solidFill>
+                <a:effectLst/>
+                <a:latin typeface="Courier New" panose="02070309020205020404" pitchFamily="49" charset="0"/>
+                <a:cs typeface="Courier New" panose="02070309020205020404" pitchFamily="49" charset="0"/>
+              </a:rPr>
+              <a:t>T </a:t>
+            </a:r>
+            <a:r>
+              <a:rPr kumimoji="0" lang="en-US" altLang="en-US" sz="1600" b="0" i="0" u="none" strike="noStrike" cap="none" normalizeH="0" baseline="0" dirty="0" smtClean="0">
+                <a:ln>
+                  <a:noFill/>
+                </a:ln>
+                <a:solidFill>
+                  <a:srgbClr val="000000"/>
+                </a:solidFill>
+                <a:effectLst/>
+                <a:latin typeface="Courier New" panose="02070309020205020404" pitchFamily="49" charset="0"/>
+                <a:cs typeface="Courier New" panose="02070309020205020404" pitchFamily="49" charset="0"/>
+              </a:rPr>
+              <a:t>get();</a:t>
+            </a:r>
+            <a:br>
+              <a:rPr kumimoji="0" lang="en-US" altLang="en-US" sz="1600" b="0" i="0" u="none" strike="noStrike" cap="none" normalizeH="0" baseline="0" dirty="0" smtClean="0">
+                <a:ln>
+                  <a:noFill/>
+                </a:ln>
+                <a:solidFill>
+                  <a:srgbClr val="000000"/>
+                </a:solidFill>
+                <a:effectLst/>
+                <a:latin typeface="Courier New" panose="02070309020205020404" pitchFamily="49" charset="0"/>
+                <a:cs typeface="Courier New" panose="02070309020205020404" pitchFamily="49" charset="0"/>
+              </a:rPr>
+            </a:br>
+            <a:r>
+              <a:rPr kumimoji="0" lang="en-US" altLang="en-US" sz="1600" b="1" i="0" u="none" strike="noStrike" cap="none" normalizeH="0" baseline="0" dirty="0" smtClean="0">
+                <a:ln>
+                  <a:noFill/>
+                </a:ln>
+                <a:solidFill>
+                  <a:srgbClr val="000080"/>
+                </a:solidFill>
+                <a:effectLst/>
+                <a:latin typeface="Courier New" panose="02070309020205020404" pitchFamily="49" charset="0"/>
+                <a:cs typeface="Courier New" panose="02070309020205020404" pitchFamily="49" charset="0"/>
+              </a:rPr>
+              <a:t>boolean </a:t>
+            </a:r>
+            <a:r>
+              <a:rPr kumimoji="0" lang="en-US" altLang="en-US" sz="1600" b="0" i="0" u="none" strike="noStrike" cap="none" normalizeH="0" baseline="0" dirty="0" err="1" smtClean="0">
+                <a:ln>
+                  <a:noFill/>
+                </a:ln>
+                <a:solidFill>
+                  <a:srgbClr val="000000"/>
+                </a:solidFill>
+                <a:effectLst/>
+                <a:latin typeface="Courier New" panose="02070309020205020404" pitchFamily="49" charset="0"/>
+                <a:cs typeface="Courier New" panose="02070309020205020404" pitchFamily="49" charset="0"/>
+              </a:rPr>
+              <a:t>isPresent</a:t>
+            </a:r>
+            <a:r>
+              <a:rPr kumimoji="0" lang="en-US" altLang="en-US" sz="1600" b="0" i="0" u="none" strike="noStrike" cap="none" normalizeH="0" baseline="0" dirty="0" smtClean="0">
+                <a:ln>
+                  <a:noFill/>
+                </a:ln>
+                <a:solidFill>
+                  <a:srgbClr val="000000"/>
+                </a:solidFill>
+                <a:effectLst/>
+                <a:latin typeface="Courier New" panose="02070309020205020404" pitchFamily="49" charset="0"/>
+                <a:cs typeface="Courier New" panose="02070309020205020404" pitchFamily="49" charset="0"/>
+              </a:rPr>
+              <a:t>();</a:t>
+            </a:r>
+            <a:br>
+              <a:rPr kumimoji="0" lang="en-US" altLang="en-US" sz="1600" b="0" i="0" u="none" strike="noStrike" cap="none" normalizeH="0" baseline="0" dirty="0" smtClean="0">
+                <a:ln>
+                  <a:noFill/>
+                </a:ln>
+                <a:solidFill>
+                  <a:srgbClr val="000000"/>
+                </a:solidFill>
+                <a:effectLst/>
+                <a:latin typeface="Courier New" panose="02070309020205020404" pitchFamily="49" charset="0"/>
+                <a:cs typeface="Courier New" panose="02070309020205020404" pitchFamily="49" charset="0"/>
+              </a:rPr>
+            </a:br>
+            <a:r>
+              <a:rPr kumimoji="0" lang="en-US" altLang="en-US" sz="1600" b="1" i="0" u="none" strike="noStrike" cap="none" normalizeH="0" baseline="0" dirty="0" smtClean="0">
+                <a:ln>
+                  <a:noFill/>
+                </a:ln>
+                <a:solidFill>
+                  <a:srgbClr val="000080"/>
+                </a:solidFill>
+                <a:effectLst/>
+                <a:latin typeface="Courier New" panose="02070309020205020404" pitchFamily="49" charset="0"/>
+                <a:cs typeface="Courier New" panose="02070309020205020404" pitchFamily="49" charset="0"/>
+              </a:rPr>
+              <a:t>boolean </a:t>
+            </a:r>
+            <a:r>
+              <a:rPr kumimoji="0" lang="en-US" altLang="en-US" sz="1600" b="0" i="0" u="none" strike="noStrike" cap="none" normalizeH="0" baseline="0" dirty="0" err="1" smtClean="0">
+                <a:ln>
+                  <a:noFill/>
+                </a:ln>
+                <a:solidFill>
+                  <a:srgbClr val="000000"/>
+                </a:solidFill>
+                <a:effectLst/>
+                <a:latin typeface="Courier New" panose="02070309020205020404" pitchFamily="49" charset="0"/>
+                <a:cs typeface="Courier New" panose="02070309020205020404" pitchFamily="49" charset="0"/>
+              </a:rPr>
+              <a:t>isEmpty</a:t>
+            </a:r>
+            <a:r>
+              <a:rPr kumimoji="0" lang="en-US" altLang="en-US" sz="1600" b="0" i="0" u="none" strike="noStrike" cap="none" normalizeH="0" baseline="0" dirty="0" smtClean="0">
+                <a:ln>
+                  <a:noFill/>
+                </a:ln>
+                <a:solidFill>
+                  <a:srgbClr val="000000"/>
+                </a:solidFill>
+                <a:effectLst/>
+                <a:latin typeface="Courier New" panose="02070309020205020404" pitchFamily="49" charset="0"/>
+                <a:cs typeface="Courier New" panose="02070309020205020404" pitchFamily="49" charset="0"/>
+              </a:rPr>
+              <a:t>();</a:t>
+            </a:r>
+            <a:br>
+              <a:rPr kumimoji="0" lang="en-US" altLang="en-US" sz="1600" b="0" i="0" u="none" strike="noStrike" cap="none" normalizeH="0" baseline="0" dirty="0" smtClean="0">
+                <a:ln>
+                  <a:noFill/>
+                </a:ln>
+                <a:solidFill>
+                  <a:srgbClr val="000000"/>
+                </a:solidFill>
+                <a:effectLst/>
+                <a:latin typeface="Courier New" panose="02070309020205020404" pitchFamily="49" charset="0"/>
+                <a:cs typeface="Courier New" panose="02070309020205020404" pitchFamily="49" charset="0"/>
+              </a:rPr>
+            </a:br>
+            <a:r>
+              <a:rPr kumimoji="0" lang="en-US" altLang="en-US" sz="1600" b="1" i="0" u="none" strike="noStrike" cap="none" normalizeH="0" baseline="0" dirty="0" smtClean="0">
+                <a:ln>
+                  <a:noFill/>
+                </a:ln>
+                <a:solidFill>
+                  <a:srgbClr val="000080"/>
+                </a:solidFill>
+                <a:effectLst/>
+                <a:latin typeface="Courier New" panose="02070309020205020404" pitchFamily="49" charset="0"/>
+                <a:cs typeface="Courier New" panose="02070309020205020404" pitchFamily="49" charset="0"/>
+              </a:rPr>
+              <a:t>void </a:t>
+            </a:r>
+            <a:r>
+              <a:rPr kumimoji="0" lang="en-US" altLang="en-US" sz="1600" b="0" i="0" u="none" strike="noStrike" cap="none" normalizeH="0" baseline="0" dirty="0" err="1" smtClean="0">
+                <a:ln>
+                  <a:noFill/>
+                </a:ln>
+                <a:solidFill>
+                  <a:srgbClr val="000000"/>
+                </a:solidFill>
+                <a:effectLst/>
+                <a:latin typeface="Courier New" panose="02070309020205020404" pitchFamily="49" charset="0"/>
+                <a:cs typeface="Courier New" panose="02070309020205020404" pitchFamily="49" charset="0"/>
+              </a:rPr>
+              <a:t>ifPresent</a:t>
+            </a:r>
+            <a:r>
+              <a:rPr kumimoji="0" lang="en-US" altLang="en-US" sz="1600" b="0" i="0" u="none" strike="noStrike" cap="none" normalizeH="0" baseline="0" dirty="0" smtClean="0">
+                <a:ln>
+                  <a:noFill/>
+                </a:ln>
+                <a:solidFill>
+                  <a:srgbClr val="000000"/>
+                </a:solidFill>
+                <a:effectLst/>
+                <a:latin typeface="Courier New" panose="02070309020205020404" pitchFamily="49" charset="0"/>
+                <a:cs typeface="Courier New" panose="02070309020205020404" pitchFamily="49" charset="0"/>
+              </a:rPr>
+              <a:t>(Consumer&lt;? </a:t>
+            </a:r>
+            <a:r>
+              <a:rPr kumimoji="0" lang="en-US" altLang="en-US" sz="1600" b="1" i="0" u="none" strike="noStrike" cap="none" normalizeH="0" baseline="0" dirty="0" smtClean="0">
+                <a:ln>
+                  <a:noFill/>
+                </a:ln>
+                <a:solidFill>
+                  <a:srgbClr val="000080"/>
+                </a:solidFill>
+                <a:effectLst/>
+                <a:latin typeface="Courier New" panose="02070309020205020404" pitchFamily="49" charset="0"/>
+                <a:cs typeface="Courier New" panose="02070309020205020404" pitchFamily="49" charset="0"/>
+              </a:rPr>
+              <a:t>super </a:t>
+            </a:r>
+            <a:r>
+              <a:rPr kumimoji="0" lang="en-US" altLang="en-US" sz="1600" b="0" i="0" u="none" strike="noStrike" cap="none" normalizeH="0" baseline="0" dirty="0" smtClean="0">
+                <a:ln>
+                  <a:noFill/>
+                </a:ln>
+                <a:solidFill>
+                  <a:srgbClr val="20999D"/>
+                </a:solidFill>
+                <a:effectLst/>
+                <a:latin typeface="Courier New" panose="02070309020205020404" pitchFamily="49" charset="0"/>
+                <a:cs typeface="Courier New" panose="02070309020205020404" pitchFamily="49" charset="0"/>
+              </a:rPr>
+              <a:t>T</a:t>
+            </a:r>
+            <a:r>
+              <a:rPr kumimoji="0" lang="en-US" altLang="en-US" sz="1600" b="0" i="0" u="none" strike="noStrike" cap="none" normalizeH="0" baseline="0" dirty="0" smtClean="0">
+                <a:ln>
+                  <a:noFill/>
+                </a:ln>
+                <a:solidFill>
+                  <a:srgbClr val="000000"/>
+                </a:solidFill>
+                <a:effectLst/>
+                <a:latin typeface="Courier New" panose="02070309020205020404" pitchFamily="49" charset="0"/>
+                <a:cs typeface="Courier New" panose="02070309020205020404" pitchFamily="49" charset="0"/>
+              </a:rPr>
+              <a:t>&gt; action);</a:t>
+            </a:r>
+            <a:br>
+              <a:rPr kumimoji="0" lang="en-US" altLang="en-US" sz="1600" b="0" i="0" u="none" strike="noStrike" cap="none" normalizeH="0" baseline="0" dirty="0" smtClean="0">
+                <a:ln>
+                  <a:noFill/>
+                </a:ln>
+                <a:solidFill>
+                  <a:srgbClr val="000000"/>
+                </a:solidFill>
+                <a:effectLst/>
+                <a:latin typeface="Courier New" panose="02070309020205020404" pitchFamily="49" charset="0"/>
+                <a:cs typeface="Courier New" panose="02070309020205020404" pitchFamily="49" charset="0"/>
+              </a:rPr>
+            </a:br>
+            <a:r>
+              <a:rPr kumimoji="0" lang="en-US" altLang="en-US" sz="1600" b="1" i="0" u="none" strike="noStrike" cap="none" normalizeH="0" baseline="0" dirty="0" smtClean="0">
+                <a:ln>
+                  <a:noFill/>
+                </a:ln>
+                <a:solidFill>
+                  <a:srgbClr val="000080"/>
+                </a:solidFill>
+                <a:effectLst/>
+                <a:latin typeface="Courier New" panose="02070309020205020404" pitchFamily="49" charset="0"/>
+                <a:cs typeface="Courier New" panose="02070309020205020404" pitchFamily="49" charset="0"/>
+              </a:rPr>
+              <a:t>void </a:t>
+            </a:r>
+            <a:r>
+              <a:rPr kumimoji="0" lang="en-US" altLang="en-US" sz="1600" b="0" i="0" u="none" strike="noStrike" cap="none" normalizeH="0" baseline="0" dirty="0" err="1" smtClean="0">
+                <a:ln>
+                  <a:noFill/>
+                </a:ln>
+                <a:solidFill>
+                  <a:srgbClr val="000000"/>
+                </a:solidFill>
+                <a:effectLst/>
+                <a:latin typeface="Courier New" panose="02070309020205020404" pitchFamily="49" charset="0"/>
+                <a:cs typeface="Courier New" panose="02070309020205020404" pitchFamily="49" charset="0"/>
+              </a:rPr>
+              <a:t>ifPresentOrElse</a:t>
+            </a:r>
+            <a:r>
+              <a:rPr kumimoji="0" lang="en-US" altLang="en-US" sz="1600" b="0" i="0" u="none" strike="noStrike" cap="none" normalizeH="0" baseline="0" dirty="0" smtClean="0">
+                <a:ln>
+                  <a:noFill/>
+                </a:ln>
+                <a:solidFill>
+                  <a:srgbClr val="000000"/>
+                </a:solidFill>
+                <a:effectLst/>
+                <a:latin typeface="Courier New" panose="02070309020205020404" pitchFamily="49" charset="0"/>
+                <a:cs typeface="Courier New" panose="02070309020205020404" pitchFamily="49" charset="0"/>
+              </a:rPr>
+              <a:t>(Consumer&lt;? </a:t>
+            </a:r>
+            <a:r>
+              <a:rPr kumimoji="0" lang="en-US" altLang="en-US" sz="1600" b="1" i="0" u="none" strike="noStrike" cap="none" normalizeH="0" baseline="0" dirty="0" smtClean="0">
+                <a:ln>
+                  <a:noFill/>
+                </a:ln>
+                <a:solidFill>
+                  <a:srgbClr val="000080"/>
+                </a:solidFill>
+                <a:effectLst/>
+                <a:latin typeface="Courier New" panose="02070309020205020404" pitchFamily="49" charset="0"/>
+                <a:cs typeface="Courier New" panose="02070309020205020404" pitchFamily="49" charset="0"/>
+              </a:rPr>
+              <a:t>super </a:t>
+            </a:r>
+            <a:r>
+              <a:rPr kumimoji="0" lang="en-US" altLang="en-US" sz="1600" b="0" i="0" u="none" strike="noStrike" cap="none" normalizeH="0" baseline="0" dirty="0" smtClean="0">
+                <a:ln>
+                  <a:noFill/>
+                </a:ln>
+                <a:solidFill>
+                  <a:srgbClr val="20999D"/>
+                </a:solidFill>
+                <a:effectLst/>
+                <a:latin typeface="Courier New" panose="02070309020205020404" pitchFamily="49" charset="0"/>
+                <a:cs typeface="Courier New" panose="02070309020205020404" pitchFamily="49" charset="0"/>
+              </a:rPr>
+              <a:t>T</a:t>
+            </a:r>
+            <a:r>
+              <a:rPr kumimoji="0" lang="en-US" altLang="en-US" sz="1600" b="0" i="0" u="none" strike="noStrike" cap="none" normalizeH="0" baseline="0" dirty="0" smtClean="0">
+                <a:ln>
+                  <a:noFill/>
+                </a:ln>
+                <a:solidFill>
+                  <a:srgbClr val="000000"/>
+                </a:solidFill>
+                <a:effectLst/>
+                <a:latin typeface="Courier New" panose="02070309020205020404" pitchFamily="49" charset="0"/>
+                <a:cs typeface="Courier New" panose="02070309020205020404" pitchFamily="49" charset="0"/>
+              </a:rPr>
+              <a:t>&gt; action, Runnable </a:t>
+            </a:r>
+            <a:r>
+              <a:rPr kumimoji="0" lang="en-US" altLang="en-US" sz="1600" b="0" i="0" u="none" strike="noStrike" cap="none" normalizeH="0" baseline="0" dirty="0" err="1" smtClean="0">
+                <a:ln>
+                  <a:noFill/>
+                </a:ln>
+                <a:solidFill>
+                  <a:srgbClr val="000000"/>
+                </a:solidFill>
+                <a:effectLst/>
+                <a:latin typeface="Courier New" panose="02070309020205020404" pitchFamily="49" charset="0"/>
+                <a:cs typeface="Courier New" panose="02070309020205020404" pitchFamily="49" charset="0"/>
+              </a:rPr>
+              <a:t>emptyAction</a:t>
+            </a:r>
+            <a:r>
+              <a:rPr kumimoji="0" lang="en-US" altLang="en-US" sz="1600" b="0" i="0" u="none" strike="noStrike" cap="none" normalizeH="0" baseline="0" dirty="0" smtClean="0">
+                <a:ln>
+                  <a:noFill/>
+                </a:ln>
+                <a:solidFill>
+                  <a:srgbClr val="000000"/>
+                </a:solidFill>
+                <a:effectLst/>
+                <a:latin typeface="Courier New" panose="02070309020205020404" pitchFamily="49" charset="0"/>
+                <a:cs typeface="Courier New" panose="02070309020205020404" pitchFamily="49" charset="0"/>
+              </a:rPr>
+              <a:t>);</a:t>
+            </a:r>
+            <a:br>
+              <a:rPr kumimoji="0" lang="en-US" altLang="en-US" sz="1600" b="0" i="0" u="none" strike="noStrike" cap="none" normalizeH="0" baseline="0" dirty="0" smtClean="0">
+                <a:ln>
+                  <a:noFill/>
+                </a:ln>
+                <a:solidFill>
+                  <a:srgbClr val="000000"/>
+                </a:solidFill>
+                <a:effectLst/>
+                <a:latin typeface="Courier New" panose="02070309020205020404" pitchFamily="49" charset="0"/>
+                <a:cs typeface="Courier New" panose="02070309020205020404" pitchFamily="49" charset="0"/>
+              </a:rPr>
+            </a:br>
+            <a:r>
+              <a:rPr kumimoji="0" lang="en-US" altLang="en-US" sz="1600" b="0" i="0" u="none" strike="noStrike" cap="none" normalizeH="0" baseline="0" dirty="0" smtClean="0">
+                <a:ln>
+                  <a:noFill/>
+                </a:ln>
+                <a:solidFill>
+                  <a:srgbClr val="000000"/>
+                </a:solidFill>
+                <a:effectLst/>
+                <a:latin typeface="Courier New" panose="02070309020205020404" pitchFamily="49" charset="0"/>
+                <a:cs typeface="Courier New" panose="02070309020205020404" pitchFamily="49" charset="0"/>
+              </a:rPr>
+              <a:t>Optional&lt;</a:t>
+            </a:r>
+            <a:r>
+              <a:rPr kumimoji="0" lang="en-US" altLang="en-US" sz="1600" b="0" i="0" u="none" strike="noStrike" cap="none" normalizeH="0" baseline="0" dirty="0" smtClean="0">
+                <a:ln>
+                  <a:noFill/>
+                </a:ln>
+                <a:solidFill>
+                  <a:srgbClr val="20999D"/>
+                </a:solidFill>
+                <a:effectLst/>
+                <a:latin typeface="Courier New" panose="02070309020205020404" pitchFamily="49" charset="0"/>
+                <a:cs typeface="Courier New" panose="02070309020205020404" pitchFamily="49" charset="0"/>
+              </a:rPr>
+              <a:t>T</a:t>
+            </a:r>
+            <a:r>
+              <a:rPr kumimoji="0" lang="en-US" altLang="en-US" sz="1600" b="0" i="0" u="none" strike="noStrike" cap="none" normalizeH="0" baseline="0" dirty="0" smtClean="0">
+                <a:ln>
+                  <a:noFill/>
+                </a:ln>
+                <a:solidFill>
+                  <a:srgbClr val="000000"/>
+                </a:solidFill>
+                <a:effectLst/>
+                <a:latin typeface="Courier New" panose="02070309020205020404" pitchFamily="49" charset="0"/>
+                <a:cs typeface="Courier New" panose="02070309020205020404" pitchFamily="49" charset="0"/>
+              </a:rPr>
+              <a:t>&gt; filter(Predicate&lt;? </a:t>
+            </a:r>
+            <a:r>
+              <a:rPr kumimoji="0" lang="en-US" altLang="en-US" sz="1600" b="1" i="0" u="none" strike="noStrike" cap="none" normalizeH="0" baseline="0" dirty="0" smtClean="0">
+                <a:ln>
+                  <a:noFill/>
+                </a:ln>
+                <a:solidFill>
+                  <a:srgbClr val="000080"/>
+                </a:solidFill>
+                <a:effectLst/>
+                <a:latin typeface="Courier New" panose="02070309020205020404" pitchFamily="49" charset="0"/>
+                <a:cs typeface="Courier New" panose="02070309020205020404" pitchFamily="49" charset="0"/>
+              </a:rPr>
+              <a:t>super </a:t>
+            </a:r>
+            <a:r>
+              <a:rPr kumimoji="0" lang="en-US" altLang="en-US" sz="1600" b="0" i="0" u="none" strike="noStrike" cap="none" normalizeH="0" baseline="0" dirty="0" smtClean="0">
+                <a:ln>
+                  <a:noFill/>
+                </a:ln>
+                <a:solidFill>
+                  <a:srgbClr val="20999D"/>
+                </a:solidFill>
+                <a:effectLst/>
+                <a:latin typeface="Courier New" panose="02070309020205020404" pitchFamily="49" charset="0"/>
+                <a:cs typeface="Courier New" panose="02070309020205020404" pitchFamily="49" charset="0"/>
+              </a:rPr>
+              <a:t>T</a:t>
+            </a:r>
+            <a:r>
+              <a:rPr kumimoji="0" lang="en-US" altLang="en-US" sz="1600" b="0" i="0" u="none" strike="noStrike" cap="none" normalizeH="0" baseline="0" dirty="0" smtClean="0">
+                <a:ln>
+                  <a:noFill/>
+                </a:ln>
+                <a:solidFill>
+                  <a:srgbClr val="000000"/>
+                </a:solidFill>
+                <a:effectLst/>
+                <a:latin typeface="Courier New" panose="02070309020205020404" pitchFamily="49" charset="0"/>
+                <a:cs typeface="Courier New" panose="02070309020205020404" pitchFamily="49" charset="0"/>
+              </a:rPr>
+              <a:t>&gt; predicate);</a:t>
+            </a:r>
+            <a:br>
+              <a:rPr kumimoji="0" lang="en-US" altLang="en-US" sz="1600" b="0" i="0" u="none" strike="noStrike" cap="none" normalizeH="0" baseline="0" dirty="0" smtClean="0">
+                <a:ln>
+                  <a:noFill/>
+                </a:ln>
+                <a:solidFill>
+                  <a:srgbClr val="000000"/>
+                </a:solidFill>
+                <a:effectLst/>
+                <a:latin typeface="Courier New" panose="02070309020205020404" pitchFamily="49" charset="0"/>
+                <a:cs typeface="Courier New" panose="02070309020205020404" pitchFamily="49" charset="0"/>
+              </a:rPr>
+            </a:br>
+            <a:r>
+              <a:rPr kumimoji="0" lang="en-US" altLang="en-US" sz="1600" b="0" i="0" u="none" strike="noStrike" cap="none" normalizeH="0" baseline="0" dirty="0" smtClean="0">
+                <a:ln>
+                  <a:noFill/>
+                </a:ln>
+                <a:solidFill>
+                  <a:srgbClr val="000000"/>
+                </a:solidFill>
+                <a:effectLst/>
+                <a:latin typeface="Courier New" panose="02070309020205020404" pitchFamily="49" charset="0"/>
+                <a:cs typeface="Courier New" panose="02070309020205020404" pitchFamily="49" charset="0"/>
+              </a:rPr>
+              <a:t>&lt;</a:t>
+            </a:r>
+            <a:r>
+              <a:rPr kumimoji="0" lang="en-US" altLang="en-US" sz="1600" b="0" i="0" u="none" strike="noStrike" cap="none" normalizeH="0" baseline="0" dirty="0" smtClean="0">
+                <a:ln>
+                  <a:noFill/>
+                </a:ln>
+                <a:solidFill>
+                  <a:srgbClr val="20999D"/>
+                </a:solidFill>
+                <a:effectLst/>
+                <a:latin typeface="Courier New" panose="02070309020205020404" pitchFamily="49" charset="0"/>
+                <a:cs typeface="Courier New" panose="02070309020205020404" pitchFamily="49" charset="0"/>
+              </a:rPr>
+              <a:t>U</a:t>
+            </a:r>
+            <a:r>
+              <a:rPr kumimoji="0" lang="en-US" altLang="en-US" sz="1600" b="0" i="0" u="none" strike="noStrike" cap="none" normalizeH="0" baseline="0" dirty="0" smtClean="0">
+                <a:ln>
+                  <a:noFill/>
+                </a:ln>
+                <a:solidFill>
+                  <a:srgbClr val="000000"/>
+                </a:solidFill>
+                <a:effectLst/>
+                <a:latin typeface="Courier New" panose="02070309020205020404" pitchFamily="49" charset="0"/>
+                <a:cs typeface="Courier New" panose="02070309020205020404" pitchFamily="49" charset="0"/>
+              </a:rPr>
+              <a:t>&gt; Optional&lt;</a:t>
+            </a:r>
+            <a:r>
+              <a:rPr kumimoji="0" lang="en-US" altLang="en-US" sz="1600" b="0" i="0" u="none" strike="noStrike" cap="none" normalizeH="0" baseline="0" dirty="0" smtClean="0">
+                <a:ln>
+                  <a:noFill/>
+                </a:ln>
+                <a:solidFill>
+                  <a:srgbClr val="20999D"/>
+                </a:solidFill>
+                <a:effectLst/>
+                <a:latin typeface="Courier New" panose="02070309020205020404" pitchFamily="49" charset="0"/>
+                <a:cs typeface="Courier New" panose="02070309020205020404" pitchFamily="49" charset="0"/>
+              </a:rPr>
+              <a:t>U</a:t>
+            </a:r>
+            <a:r>
+              <a:rPr kumimoji="0" lang="en-US" altLang="en-US" sz="1600" b="0" i="0" u="none" strike="noStrike" cap="none" normalizeH="0" baseline="0" dirty="0" smtClean="0">
+                <a:ln>
+                  <a:noFill/>
+                </a:ln>
+                <a:solidFill>
+                  <a:srgbClr val="000000"/>
+                </a:solidFill>
+                <a:effectLst/>
+                <a:latin typeface="Courier New" panose="02070309020205020404" pitchFamily="49" charset="0"/>
+                <a:cs typeface="Courier New" panose="02070309020205020404" pitchFamily="49" charset="0"/>
+              </a:rPr>
+              <a:t>&gt; map(Function&lt;? </a:t>
+            </a:r>
+            <a:r>
+              <a:rPr kumimoji="0" lang="en-US" altLang="en-US" sz="1600" b="1" i="0" u="none" strike="noStrike" cap="none" normalizeH="0" baseline="0" dirty="0" smtClean="0">
+                <a:ln>
+                  <a:noFill/>
+                </a:ln>
+                <a:solidFill>
+                  <a:srgbClr val="000080"/>
+                </a:solidFill>
+                <a:effectLst/>
+                <a:latin typeface="Courier New" panose="02070309020205020404" pitchFamily="49" charset="0"/>
+                <a:cs typeface="Courier New" panose="02070309020205020404" pitchFamily="49" charset="0"/>
+              </a:rPr>
+              <a:t>super </a:t>
+            </a:r>
+            <a:r>
+              <a:rPr kumimoji="0" lang="en-US" altLang="en-US" sz="1600" b="0" i="0" u="none" strike="noStrike" cap="none" normalizeH="0" baseline="0" dirty="0" smtClean="0">
+                <a:ln>
+                  <a:noFill/>
+                </a:ln>
+                <a:solidFill>
+                  <a:srgbClr val="20999D"/>
+                </a:solidFill>
+                <a:effectLst/>
+                <a:latin typeface="Courier New" panose="02070309020205020404" pitchFamily="49" charset="0"/>
+                <a:cs typeface="Courier New" panose="02070309020205020404" pitchFamily="49" charset="0"/>
+              </a:rPr>
+              <a:t>T</a:t>
+            </a:r>
+            <a:r>
+              <a:rPr kumimoji="0" lang="en-US" altLang="en-US" sz="1600" b="0" i="0" u="none" strike="noStrike" cap="none" normalizeH="0" baseline="0" dirty="0" smtClean="0">
+                <a:ln>
+                  <a:noFill/>
+                </a:ln>
+                <a:solidFill>
+                  <a:srgbClr val="000000"/>
+                </a:solidFill>
+                <a:effectLst/>
+                <a:latin typeface="Courier New" panose="02070309020205020404" pitchFamily="49" charset="0"/>
+                <a:cs typeface="Courier New" panose="02070309020205020404" pitchFamily="49" charset="0"/>
+              </a:rPr>
+              <a:t>, ? </a:t>
+            </a:r>
+            <a:r>
+              <a:rPr kumimoji="0" lang="en-US" altLang="en-US" sz="1600" b="1" i="0" u="none" strike="noStrike" cap="none" normalizeH="0" baseline="0" dirty="0" smtClean="0">
+                <a:ln>
+                  <a:noFill/>
+                </a:ln>
+                <a:solidFill>
+                  <a:srgbClr val="000080"/>
+                </a:solidFill>
+                <a:effectLst/>
+                <a:latin typeface="Courier New" panose="02070309020205020404" pitchFamily="49" charset="0"/>
+                <a:cs typeface="Courier New" panose="02070309020205020404" pitchFamily="49" charset="0"/>
+              </a:rPr>
+              <a:t>extends </a:t>
+            </a:r>
+            <a:r>
+              <a:rPr kumimoji="0" lang="en-US" altLang="en-US" sz="1600" b="0" i="0" u="none" strike="noStrike" cap="none" normalizeH="0" baseline="0" dirty="0" smtClean="0">
+                <a:ln>
+                  <a:noFill/>
+                </a:ln>
+                <a:solidFill>
+                  <a:srgbClr val="20999D"/>
+                </a:solidFill>
+                <a:effectLst/>
+                <a:latin typeface="Courier New" panose="02070309020205020404" pitchFamily="49" charset="0"/>
+                <a:cs typeface="Courier New" panose="02070309020205020404" pitchFamily="49" charset="0"/>
+              </a:rPr>
+              <a:t>U</a:t>
+            </a:r>
+            <a:r>
+              <a:rPr kumimoji="0" lang="en-US" altLang="en-US" sz="1600" b="0" i="0" u="none" strike="noStrike" cap="none" normalizeH="0" baseline="0" dirty="0" smtClean="0">
+                <a:ln>
+                  <a:noFill/>
+                </a:ln>
+                <a:solidFill>
+                  <a:srgbClr val="000000"/>
+                </a:solidFill>
+                <a:effectLst/>
+                <a:latin typeface="Courier New" panose="02070309020205020404" pitchFamily="49" charset="0"/>
+                <a:cs typeface="Courier New" panose="02070309020205020404" pitchFamily="49" charset="0"/>
+              </a:rPr>
+              <a:t>&gt; mapper);</a:t>
+            </a:r>
+            <a:br>
+              <a:rPr kumimoji="0" lang="en-US" altLang="en-US" sz="1600" b="0" i="0" u="none" strike="noStrike" cap="none" normalizeH="0" baseline="0" dirty="0" smtClean="0">
+                <a:ln>
+                  <a:noFill/>
+                </a:ln>
+                <a:solidFill>
+                  <a:srgbClr val="000000"/>
+                </a:solidFill>
+                <a:effectLst/>
+                <a:latin typeface="Courier New" panose="02070309020205020404" pitchFamily="49" charset="0"/>
+                <a:cs typeface="Courier New" panose="02070309020205020404" pitchFamily="49" charset="0"/>
+              </a:rPr>
+            </a:br>
+            <a:r>
+              <a:rPr kumimoji="0" lang="en-US" altLang="en-US" sz="1600" b="0" i="0" u="none" strike="noStrike" cap="none" normalizeH="0" baseline="0" dirty="0" smtClean="0">
+                <a:ln>
+                  <a:noFill/>
+                </a:ln>
+                <a:solidFill>
+                  <a:srgbClr val="000000"/>
+                </a:solidFill>
+                <a:effectLst/>
+                <a:latin typeface="Courier New" panose="02070309020205020404" pitchFamily="49" charset="0"/>
+                <a:cs typeface="Courier New" panose="02070309020205020404" pitchFamily="49" charset="0"/>
+              </a:rPr>
+              <a:t>&lt;</a:t>
+            </a:r>
+            <a:r>
+              <a:rPr kumimoji="0" lang="en-US" altLang="en-US" sz="1600" b="0" i="0" u="none" strike="noStrike" cap="none" normalizeH="0" baseline="0" dirty="0" smtClean="0">
+                <a:ln>
+                  <a:noFill/>
+                </a:ln>
+                <a:solidFill>
+                  <a:srgbClr val="20999D"/>
+                </a:solidFill>
+                <a:effectLst/>
+                <a:latin typeface="Courier New" panose="02070309020205020404" pitchFamily="49" charset="0"/>
+                <a:cs typeface="Courier New" panose="02070309020205020404" pitchFamily="49" charset="0"/>
+              </a:rPr>
+              <a:t>U</a:t>
+            </a:r>
+            <a:r>
+              <a:rPr kumimoji="0" lang="en-US" altLang="en-US" sz="1600" b="0" i="0" u="none" strike="noStrike" cap="none" normalizeH="0" baseline="0" dirty="0" smtClean="0">
+                <a:ln>
+                  <a:noFill/>
+                </a:ln>
+                <a:solidFill>
+                  <a:srgbClr val="000000"/>
+                </a:solidFill>
+                <a:effectLst/>
+                <a:latin typeface="Courier New" panose="02070309020205020404" pitchFamily="49" charset="0"/>
+                <a:cs typeface="Courier New" panose="02070309020205020404" pitchFamily="49" charset="0"/>
+              </a:rPr>
+              <a:t>&gt; Optional&lt;</a:t>
+            </a:r>
+            <a:r>
+              <a:rPr kumimoji="0" lang="en-US" altLang="en-US" sz="1600" b="0" i="0" u="none" strike="noStrike" cap="none" normalizeH="0" baseline="0" dirty="0" smtClean="0">
+                <a:ln>
+                  <a:noFill/>
+                </a:ln>
+                <a:solidFill>
+                  <a:srgbClr val="20999D"/>
+                </a:solidFill>
+                <a:effectLst/>
+                <a:latin typeface="Courier New" panose="02070309020205020404" pitchFamily="49" charset="0"/>
+                <a:cs typeface="Courier New" panose="02070309020205020404" pitchFamily="49" charset="0"/>
+              </a:rPr>
+              <a:t>U</a:t>
+            </a:r>
+            <a:r>
+              <a:rPr kumimoji="0" lang="en-US" altLang="en-US" sz="1600" b="0" i="0" u="none" strike="noStrike" cap="none" normalizeH="0" baseline="0" dirty="0" smtClean="0">
+                <a:ln>
+                  <a:noFill/>
+                </a:ln>
+                <a:solidFill>
+                  <a:srgbClr val="000000"/>
+                </a:solidFill>
+                <a:effectLst/>
+                <a:latin typeface="Courier New" panose="02070309020205020404" pitchFamily="49" charset="0"/>
+                <a:cs typeface="Courier New" panose="02070309020205020404" pitchFamily="49" charset="0"/>
+              </a:rPr>
+              <a:t>&gt; </a:t>
+            </a:r>
+            <a:r>
+              <a:rPr kumimoji="0" lang="en-US" altLang="en-US" sz="1600" b="0" i="0" u="none" strike="noStrike" cap="none" normalizeH="0" baseline="0" dirty="0" err="1" smtClean="0">
+                <a:ln>
+                  <a:noFill/>
+                </a:ln>
+                <a:solidFill>
+                  <a:srgbClr val="000000"/>
+                </a:solidFill>
+                <a:effectLst/>
+                <a:latin typeface="Courier New" panose="02070309020205020404" pitchFamily="49" charset="0"/>
+                <a:cs typeface="Courier New" panose="02070309020205020404" pitchFamily="49" charset="0"/>
+              </a:rPr>
+              <a:t>flatMap</a:t>
+            </a:r>
+            <a:r>
+              <a:rPr kumimoji="0" lang="en-US" altLang="en-US" sz="1600" b="0" i="0" u="none" strike="noStrike" cap="none" normalizeH="0" baseline="0" dirty="0" smtClean="0">
+                <a:ln>
+                  <a:noFill/>
+                </a:ln>
+                <a:solidFill>
+                  <a:srgbClr val="000000"/>
+                </a:solidFill>
+                <a:effectLst/>
+                <a:latin typeface="Courier New" panose="02070309020205020404" pitchFamily="49" charset="0"/>
+                <a:cs typeface="Courier New" panose="02070309020205020404" pitchFamily="49" charset="0"/>
+              </a:rPr>
+              <a:t>(Function&lt;? </a:t>
+            </a:r>
+            <a:r>
+              <a:rPr kumimoji="0" lang="en-US" altLang="en-US" sz="1600" b="1" i="0" u="none" strike="noStrike" cap="none" normalizeH="0" baseline="0" dirty="0" smtClean="0">
+                <a:ln>
+                  <a:noFill/>
+                </a:ln>
+                <a:solidFill>
+                  <a:srgbClr val="000080"/>
+                </a:solidFill>
+                <a:effectLst/>
+                <a:latin typeface="Courier New" panose="02070309020205020404" pitchFamily="49" charset="0"/>
+                <a:cs typeface="Courier New" panose="02070309020205020404" pitchFamily="49" charset="0"/>
+              </a:rPr>
+              <a:t>super </a:t>
+            </a:r>
+            <a:r>
+              <a:rPr kumimoji="0" lang="en-US" altLang="en-US" sz="1600" b="0" i="0" u="none" strike="noStrike" cap="none" normalizeH="0" baseline="0" dirty="0" smtClean="0">
+                <a:ln>
+                  <a:noFill/>
+                </a:ln>
+                <a:solidFill>
+                  <a:srgbClr val="20999D"/>
+                </a:solidFill>
+                <a:effectLst/>
+                <a:latin typeface="Courier New" panose="02070309020205020404" pitchFamily="49" charset="0"/>
+                <a:cs typeface="Courier New" panose="02070309020205020404" pitchFamily="49" charset="0"/>
+              </a:rPr>
+              <a:t>T</a:t>
+            </a:r>
+            <a:r>
+              <a:rPr kumimoji="0" lang="en-US" altLang="en-US" sz="1600" b="0" i="0" u="none" strike="noStrike" cap="none" normalizeH="0" baseline="0" dirty="0" smtClean="0">
+                <a:ln>
+                  <a:noFill/>
+                </a:ln>
+                <a:solidFill>
+                  <a:srgbClr val="000000"/>
+                </a:solidFill>
+                <a:effectLst/>
+                <a:latin typeface="Courier New" panose="02070309020205020404" pitchFamily="49" charset="0"/>
+                <a:cs typeface="Courier New" panose="02070309020205020404" pitchFamily="49" charset="0"/>
+              </a:rPr>
+              <a:t>, ? </a:t>
+            </a:r>
+            <a:r>
+              <a:rPr kumimoji="0" lang="en-US" altLang="en-US" sz="1600" b="1" i="0" u="none" strike="noStrike" cap="none" normalizeH="0" baseline="0" dirty="0" smtClean="0">
+                <a:ln>
+                  <a:noFill/>
+                </a:ln>
+                <a:solidFill>
+                  <a:srgbClr val="000080"/>
+                </a:solidFill>
+                <a:effectLst/>
+                <a:latin typeface="Courier New" panose="02070309020205020404" pitchFamily="49" charset="0"/>
+                <a:cs typeface="Courier New" panose="02070309020205020404" pitchFamily="49" charset="0"/>
+              </a:rPr>
+              <a:t>extends </a:t>
+            </a:r>
+            <a:r>
+              <a:rPr kumimoji="0" lang="en-US" altLang="en-US" sz="1600" b="0" i="0" u="none" strike="noStrike" cap="none" normalizeH="0" baseline="0" dirty="0" smtClean="0">
+                <a:ln>
+                  <a:noFill/>
+                </a:ln>
+                <a:solidFill>
+                  <a:srgbClr val="000000"/>
+                </a:solidFill>
+                <a:effectLst/>
+                <a:latin typeface="Courier New" panose="02070309020205020404" pitchFamily="49" charset="0"/>
+                <a:cs typeface="Courier New" panose="02070309020205020404" pitchFamily="49" charset="0"/>
+              </a:rPr>
+              <a:t>Optional&lt;? </a:t>
+            </a:r>
+            <a:r>
+              <a:rPr kumimoji="0" lang="en-US" altLang="en-US" sz="1600" b="1" i="0" u="none" strike="noStrike" cap="none" normalizeH="0" baseline="0" dirty="0" smtClean="0">
+                <a:ln>
+                  <a:noFill/>
+                </a:ln>
+                <a:solidFill>
+                  <a:srgbClr val="000080"/>
+                </a:solidFill>
+                <a:effectLst/>
+                <a:latin typeface="Courier New" panose="02070309020205020404" pitchFamily="49" charset="0"/>
+                <a:cs typeface="Courier New" panose="02070309020205020404" pitchFamily="49" charset="0"/>
+              </a:rPr>
+              <a:t>extends </a:t>
+            </a:r>
+            <a:r>
+              <a:rPr kumimoji="0" lang="en-US" altLang="en-US" sz="1600" b="0" i="0" u="none" strike="noStrike" cap="none" normalizeH="0" baseline="0" dirty="0" smtClean="0">
+                <a:ln>
+                  <a:noFill/>
+                </a:ln>
+                <a:solidFill>
+                  <a:srgbClr val="20999D"/>
+                </a:solidFill>
+                <a:effectLst/>
+                <a:latin typeface="Courier New" panose="02070309020205020404" pitchFamily="49" charset="0"/>
+                <a:cs typeface="Courier New" panose="02070309020205020404" pitchFamily="49" charset="0"/>
+              </a:rPr>
+              <a:t>U</a:t>
+            </a:r>
+            <a:r>
+              <a:rPr kumimoji="0" lang="en-US" altLang="en-US" sz="1600" b="0" i="0" u="none" strike="noStrike" cap="none" normalizeH="0" baseline="0" dirty="0" smtClean="0">
+                <a:ln>
+                  <a:noFill/>
+                </a:ln>
+                <a:solidFill>
+                  <a:srgbClr val="000000"/>
+                </a:solidFill>
+                <a:effectLst/>
+                <a:latin typeface="Courier New" panose="02070309020205020404" pitchFamily="49" charset="0"/>
+                <a:cs typeface="Courier New" panose="02070309020205020404" pitchFamily="49" charset="0"/>
+              </a:rPr>
+              <a:t>&gt;&gt; mapper);</a:t>
+            </a:r>
+            <a:br>
+              <a:rPr kumimoji="0" lang="en-US" altLang="en-US" sz="1600" b="0" i="0" u="none" strike="noStrike" cap="none" normalizeH="0" baseline="0" dirty="0" smtClean="0">
+                <a:ln>
+                  <a:noFill/>
+                </a:ln>
+                <a:solidFill>
+                  <a:srgbClr val="000000"/>
+                </a:solidFill>
+                <a:effectLst/>
+                <a:latin typeface="Courier New" panose="02070309020205020404" pitchFamily="49" charset="0"/>
+                <a:cs typeface="Courier New" panose="02070309020205020404" pitchFamily="49" charset="0"/>
+              </a:rPr>
+            </a:br>
+            <a:r>
+              <a:rPr kumimoji="0" lang="en-US" altLang="en-US" sz="1600" b="0" i="0" u="none" strike="noStrike" cap="none" normalizeH="0" baseline="0" dirty="0" smtClean="0">
+                <a:ln>
+                  <a:noFill/>
+                </a:ln>
+                <a:solidFill>
+                  <a:srgbClr val="000000"/>
+                </a:solidFill>
+                <a:effectLst/>
+                <a:latin typeface="Courier New" panose="02070309020205020404" pitchFamily="49" charset="0"/>
+                <a:cs typeface="Courier New" panose="02070309020205020404" pitchFamily="49" charset="0"/>
+              </a:rPr>
+              <a:t>Optional&lt;</a:t>
+            </a:r>
+            <a:r>
+              <a:rPr kumimoji="0" lang="en-US" altLang="en-US" sz="1600" b="0" i="0" u="none" strike="noStrike" cap="none" normalizeH="0" baseline="0" dirty="0" smtClean="0">
+                <a:ln>
+                  <a:noFill/>
+                </a:ln>
+                <a:solidFill>
+                  <a:srgbClr val="20999D"/>
+                </a:solidFill>
+                <a:effectLst/>
+                <a:latin typeface="Courier New" panose="02070309020205020404" pitchFamily="49" charset="0"/>
+                <a:cs typeface="Courier New" panose="02070309020205020404" pitchFamily="49" charset="0"/>
+              </a:rPr>
+              <a:t>T</a:t>
+            </a:r>
+            <a:r>
+              <a:rPr kumimoji="0" lang="en-US" altLang="en-US" sz="1600" b="0" i="0" u="none" strike="noStrike" cap="none" normalizeH="0" baseline="0" dirty="0" smtClean="0">
+                <a:ln>
+                  <a:noFill/>
+                </a:ln>
+                <a:solidFill>
+                  <a:srgbClr val="000000"/>
+                </a:solidFill>
+                <a:effectLst/>
+                <a:latin typeface="Courier New" panose="02070309020205020404" pitchFamily="49" charset="0"/>
+                <a:cs typeface="Courier New" panose="02070309020205020404" pitchFamily="49" charset="0"/>
+              </a:rPr>
+              <a:t>&gt; or(Supplier&lt;? </a:t>
+            </a:r>
+            <a:r>
+              <a:rPr kumimoji="0" lang="en-US" altLang="en-US" sz="1600" b="1" i="0" u="none" strike="noStrike" cap="none" normalizeH="0" baseline="0" dirty="0" smtClean="0">
+                <a:ln>
+                  <a:noFill/>
+                </a:ln>
+                <a:solidFill>
+                  <a:srgbClr val="000080"/>
+                </a:solidFill>
+                <a:effectLst/>
+                <a:latin typeface="Courier New" panose="02070309020205020404" pitchFamily="49" charset="0"/>
+                <a:cs typeface="Courier New" panose="02070309020205020404" pitchFamily="49" charset="0"/>
+              </a:rPr>
+              <a:t>extends </a:t>
+            </a:r>
+            <a:r>
+              <a:rPr kumimoji="0" lang="en-US" altLang="en-US" sz="1600" b="0" i="0" u="none" strike="noStrike" cap="none" normalizeH="0" baseline="0" dirty="0" smtClean="0">
+                <a:ln>
+                  <a:noFill/>
+                </a:ln>
+                <a:solidFill>
+                  <a:srgbClr val="000000"/>
+                </a:solidFill>
+                <a:effectLst/>
+                <a:latin typeface="Courier New" panose="02070309020205020404" pitchFamily="49" charset="0"/>
+                <a:cs typeface="Courier New" panose="02070309020205020404" pitchFamily="49" charset="0"/>
+              </a:rPr>
+              <a:t>Optional&lt;? </a:t>
+            </a:r>
+            <a:r>
+              <a:rPr kumimoji="0" lang="en-US" altLang="en-US" sz="1600" b="1" i="0" u="none" strike="noStrike" cap="none" normalizeH="0" baseline="0" dirty="0" smtClean="0">
+                <a:ln>
+                  <a:noFill/>
+                </a:ln>
+                <a:solidFill>
+                  <a:srgbClr val="000080"/>
+                </a:solidFill>
+                <a:effectLst/>
+                <a:latin typeface="Courier New" panose="02070309020205020404" pitchFamily="49" charset="0"/>
+                <a:cs typeface="Courier New" panose="02070309020205020404" pitchFamily="49" charset="0"/>
+              </a:rPr>
+              <a:t>extends </a:t>
+            </a:r>
+            <a:r>
+              <a:rPr kumimoji="0" lang="en-US" altLang="en-US" sz="1600" b="0" i="0" u="none" strike="noStrike" cap="none" normalizeH="0" baseline="0" dirty="0" smtClean="0">
+                <a:ln>
+                  <a:noFill/>
+                </a:ln>
+                <a:solidFill>
+                  <a:srgbClr val="20999D"/>
+                </a:solidFill>
+                <a:effectLst/>
+                <a:latin typeface="Courier New" panose="02070309020205020404" pitchFamily="49" charset="0"/>
+                <a:cs typeface="Courier New" panose="02070309020205020404" pitchFamily="49" charset="0"/>
+              </a:rPr>
+              <a:t>T</a:t>
+            </a:r>
+            <a:r>
+              <a:rPr kumimoji="0" lang="en-US" altLang="en-US" sz="1600" b="0" i="0" u="none" strike="noStrike" cap="none" normalizeH="0" baseline="0" dirty="0" smtClean="0">
+                <a:ln>
+                  <a:noFill/>
+                </a:ln>
+                <a:solidFill>
+                  <a:srgbClr val="000000"/>
+                </a:solidFill>
+                <a:effectLst/>
+                <a:latin typeface="Courier New" panose="02070309020205020404" pitchFamily="49" charset="0"/>
+                <a:cs typeface="Courier New" panose="02070309020205020404" pitchFamily="49" charset="0"/>
+              </a:rPr>
+              <a:t>&gt;&gt; supplier);</a:t>
+            </a:r>
+            <a:br>
+              <a:rPr kumimoji="0" lang="en-US" altLang="en-US" sz="1600" b="0" i="0" u="none" strike="noStrike" cap="none" normalizeH="0" baseline="0" dirty="0" smtClean="0">
+                <a:ln>
+                  <a:noFill/>
+                </a:ln>
+                <a:solidFill>
+                  <a:srgbClr val="000000"/>
+                </a:solidFill>
+                <a:effectLst/>
+                <a:latin typeface="Courier New" panose="02070309020205020404" pitchFamily="49" charset="0"/>
+                <a:cs typeface="Courier New" panose="02070309020205020404" pitchFamily="49" charset="0"/>
+              </a:rPr>
+            </a:br>
+            <a:r>
+              <a:rPr kumimoji="0" lang="en-US" altLang="en-US" sz="1600" b="0" i="0" u="none" strike="noStrike" cap="none" normalizeH="0" baseline="0" dirty="0" smtClean="0">
+                <a:ln>
+                  <a:noFill/>
+                </a:ln>
+                <a:solidFill>
+                  <a:srgbClr val="000000"/>
+                </a:solidFill>
+                <a:effectLst/>
+                <a:latin typeface="Courier New" panose="02070309020205020404" pitchFamily="49" charset="0"/>
+                <a:cs typeface="Courier New" panose="02070309020205020404" pitchFamily="49" charset="0"/>
+              </a:rPr>
+              <a:t>Stream&lt;</a:t>
+            </a:r>
+            <a:r>
+              <a:rPr kumimoji="0" lang="en-US" altLang="en-US" sz="1600" b="0" i="0" u="none" strike="noStrike" cap="none" normalizeH="0" baseline="0" dirty="0" smtClean="0">
+                <a:ln>
+                  <a:noFill/>
+                </a:ln>
+                <a:solidFill>
+                  <a:srgbClr val="20999D"/>
+                </a:solidFill>
+                <a:effectLst/>
+                <a:latin typeface="Courier New" panose="02070309020205020404" pitchFamily="49" charset="0"/>
+                <a:cs typeface="Courier New" panose="02070309020205020404" pitchFamily="49" charset="0"/>
+              </a:rPr>
+              <a:t>T</a:t>
+            </a:r>
+            <a:r>
+              <a:rPr kumimoji="0" lang="en-US" altLang="en-US" sz="1600" b="0" i="0" u="none" strike="noStrike" cap="none" normalizeH="0" baseline="0" dirty="0" smtClean="0">
+                <a:ln>
+                  <a:noFill/>
+                </a:ln>
+                <a:solidFill>
+                  <a:srgbClr val="000000"/>
+                </a:solidFill>
+                <a:effectLst/>
+                <a:latin typeface="Courier New" panose="02070309020205020404" pitchFamily="49" charset="0"/>
+                <a:cs typeface="Courier New" panose="02070309020205020404" pitchFamily="49" charset="0"/>
+              </a:rPr>
+              <a:t>&gt; stream();</a:t>
+            </a:r>
+            <a:br>
+              <a:rPr kumimoji="0" lang="en-US" altLang="en-US" sz="1600" b="0" i="0" u="none" strike="noStrike" cap="none" normalizeH="0" baseline="0" dirty="0" smtClean="0">
+                <a:ln>
+                  <a:noFill/>
+                </a:ln>
+                <a:solidFill>
+                  <a:srgbClr val="000000"/>
+                </a:solidFill>
+                <a:effectLst/>
+                <a:latin typeface="Courier New" panose="02070309020205020404" pitchFamily="49" charset="0"/>
+                <a:cs typeface="Courier New" panose="02070309020205020404" pitchFamily="49" charset="0"/>
+              </a:rPr>
+            </a:br>
+            <a:r>
+              <a:rPr kumimoji="0" lang="en-US" altLang="en-US" sz="1600" b="0" i="0" u="none" strike="noStrike" cap="none" normalizeH="0" baseline="0" dirty="0" smtClean="0">
+                <a:ln>
+                  <a:noFill/>
+                </a:ln>
+                <a:solidFill>
+                  <a:srgbClr val="20999D"/>
+                </a:solidFill>
+                <a:effectLst/>
+                <a:latin typeface="Courier New" panose="02070309020205020404" pitchFamily="49" charset="0"/>
+                <a:cs typeface="Courier New" panose="02070309020205020404" pitchFamily="49" charset="0"/>
+              </a:rPr>
+              <a:t>T </a:t>
+            </a:r>
+            <a:r>
+              <a:rPr kumimoji="0" lang="en-US" altLang="en-US" sz="1600" b="0" i="0" u="none" strike="noStrike" cap="none" normalizeH="0" baseline="0" dirty="0" err="1" smtClean="0">
+                <a:ln>
+                  <a:noFill/>
+                </a:ln>
+                <a:solidFill>
+                  <a:srgbClr val="000000"/>
+                </a:solidFill>
+                <a:effectLst/>
+                <a:latin typeface="Courier New" panose="02070309020205020404" pitchFamily="49" charset="0"/>
+                <a:cs typeface="Courier New" panose="02070309020205020404" pitchFamily="49" charset="0"/>
+              </a:rPr>
+              <a:t>orElse</a:t>
+            </a:r>
+            <a:r>
+              <a:rPr kumimoji="0" lang="en-US" altLang="en-US" sz="1600" b="0" i="0" u="none" strike="noStrike" cap="none" normalizeH="0" baseline="0" dirty="0" smtClean="0">
+                <a:ln>
+                  <a:noFill/>
+                </a:ln>
+                <a:solidFill>
+                  <a:srgbClr val="000000"/>
+                </a:solidFill>
+                <a:effectLst/>
+                <a:latin typeface="Courier New" panose="02070309020205020404" pitchFamily="49" charset="0"/>
+                <a:cs typeface="Courier New" panose="02070309020205020404" pitchFamily="49" charset="0"/>
+              </a:rPr>
+              <a:t>(</a:t>
+            </a:r>
+            <a:r>
+              <a:rPr kumimoji="0" lang="en-US" altLang="en-US" sz="1600" b="0" i="0" u="none" strike="noStrike" cap="none" normalizeH="0" baseline="0" dirty="0" smtClean="0">
+                <a:ln>
+                  <a:noFill/>
+                </a:ln>
+                <a:solidFill>
+                  <a:srgbClr val="20999D"/>
+                </a:solidFill>
+                <a:effectLst/>
+                <a:latin typeface="Courier New" panose="02070309020205020404" pitchFamily="49" charset="0"/>
+                <a:cs typeface="Courier New" panose="02070309020205020404" pitchFamily="49" charset="0"/>
+              </a:rPr>
+              <a:t>T </a:t>
+            </a:r>
+            <a:r>
+              <a:rPr kumimoji="0" lang="en-US" altLang="en-US" sz="1600" b="0" i="0" u="none" strike="noStrike" cap="none" normalizeH="0" baseline="0" dirty="0" smtClean="0">
+                <a:ln>
+                  <a:noFill/>
+                </a:ln>
+                <a:solidFill>
+                  <a:srgbClr val="000000"/>
+                </a:solidFill>
+                <a:effectLst/>
+                <a:latin typeface="Courier New" panose="02070309020205020404" pitchFamily="49" charset="0"/>
+                <a:cs typeface="Courier New" panose="02070309020205020404" pitchFamily="49" charset="0"/>
+              </a:rPr>
+              <a:t>other);</a:t>
+            </a:r>
+            <a:br>
+              <a:rPr kumimoji="0" lang="en-US" altLang="en-US" sz="1600" b="0" i="0" u="none" strike="noStrike" cap="none" normalizeH="0" baseline="0" dirty="0" smtClean="0">
+                <a:ln>
+                  <a:noFill/>
+                </a:ln>
+                <a:solidFill>
+                  <a:srgbClr val="000000"/>
+                </a:solidFill>
+                <a:effectLst/>
+                <a:latin typeface="Courier New" panose="02070309020205020404" pitchFamily="49" charset="0"/>
+                <a:cs typeface="Courier New" panose="02070309020205020404" pitchFamily="49" charset="0"/>
+              </a:rPr>
+            </a:br>
+            <a:r>
+              <a:rPr kumimoji="0" lang="en-US" altLang="en-US" sz="1600" b="0" i="0" u="none" strike="noStrike" cap="none" normalizeH="0" baseline="0" dirty="0" smtClean="0">
+                <a:ln>
+                  <a:noFill/>
+                </a:ln>
+                <a:solidFill>
+                  <a:srgbClr val="20999D"/>
+                </a:solidFill>
+                <a:effectLst/>
+                <a:latin typeface="Courier New" panose="02070309020205020404" pitchFamily="49" charset="0"/>
+                <a:cs typeface="Courier New" panose="02070309020205020404" pitchFamily="49" charset="0"/>
+              </a:rPr>
+              <a:t>T </a:t>
+            </a:r>
+            <a:r>
+              <a:rPr kumimoji="0" lang="en-US" altLang="en-US" sz="1600" b="0" i="0" u="none" strike="noStrike" cap="none" normalizeH="0" baseline="0" dirty="0" err="1" smtClean="0">
+                <a:ln>
+                  <a:noFill/>
+                </a:ln>
+                <a:solidFill>
+                  <a:srgbClr val="000000"/>
+                </a:solidFill>
+                <a:effectLst/>
+                <a:latin typeface="Courier New" panose="02070309020205020404" pitchFamily="49" charset="0"/>
+                <a:cs typeface="Courier New" panose="02070309020205020404" pitchFamily="49" charset="0"/>
+              </a:rPr>
+              <a:t>orElseGet</a:t>
+            </a:r>
+            <a:r>
+              <a:rPr kumimoji="0" lang="en-US" altLang="en-US" sz="1600" b="0" i="0" u="none" strike="noStrike" cap="none" normalizeH="0" baseline="0" dirty="0" smtClean="0">
+                <a:ln>
+                  <a:noFill/>
+                </a:ln>
+                <a:solidFill>
+                  <a:srgbClr val="000000"/>
+                </a:solidFill>
+                <a:effectLst/>
+                <a:latin typeface="Courier New" panose="02070309020205020404" pitchFamily="49" charset="0"/>
+                <a:cs typeface="Courier New" panose="02070309020205020404" pitchFamily="49" charset="0"/>
+              </a:rPr>
+              <a:t>(Supplier&lt;? </a:t>
+            </a:r>
+            <a:r>
+              <a:rPr kumimoji="0" lang="en-US" altLang="en-US" sz="1600" b="1" i="0" u="none" strike="noStrike" cap="none" normalizeH="0" baseline="0" dirty="0" smtClean="0">
+                <a:ln>
+                  <a:noFill/>
+                </a:ln>
+                <a:solidFill>
+                  <a:srgbClr val="000080"/>
+                </a:solidFill>
+                <a:effectLst/>
+                <a:latin typeface="Courier New" panose="02070309020205020404" pitchFamily="49" charset="0"/>
+                <a:cs typeface="Courier New" panose="02070309020205020404" pitchFamily="49" charset="0"/>
+              </a:rPr>
+              <a:t>extends </a:t>
+            </a:r>
+            <a:r>
+              <a:rPr kumimoji="0" lang="en-US" altLang="en-US" sz="1600" b="0" i="0" u="none" strike="noStrike" cap="none" normalizeH="0" baseline="0" dirty="0" smtClean="0">
+                <a:ln>
+                  <a:noFill/>
+                </a:ln>
+                <a:solidFill>
+                  <a:srgbClr val="20999D"/>
+                </a:solidFill>
+                <a:effectLst/>
+                <a:latin typeface="Courier New" panose="02070309020205020404" pitchFamily="49" charset="0"/>
+                <a:cs typeface="Courier New" panose="02070309020205020404" pitchFamily="49" charset="0"/>
+              </a:rPr>
+              <a:t>T</a:t>
+            </a:r>
+            <a:r>
+              <a:rPr kumimoji="0" lang="en-US" altLang="en-US" sz="1600" b="0" i="0" u="none" strike="noStrike" cap="none" normalizeH="0" baseline="0" dirty="0" smtClean="0">
+                <a:ln>
+                  <a:noFill/>
+                </a:ln>
+                <a:solidFill>
+                  <a:srgbClr val="000000"/>
+                </a:solidFill>
+                <a:effectLst/>
+                <a:latin typeface="Courier New" panose="02070309020205020404" pitchFamily="49" charset="0"/>
+                <a:cs typeface="Courier New" panose="02070309020205020404" pitchFamily="49" charset="0"/>
+              </a:rPr>
+              <a:t>&gt; supplier);</a:t>
+            </a:r>
+            <a:br>
+              <a:rPr kumimoji="0" lang="en-US" altLang="en-US" sz="1600" b="0" i="0" u="none" strike="noStrike" cap="none" normalizeH="0" baseline="0" dirty="0" smtClean="0">
+                <a:ln>
+                  <a:noFill/>
+                </a:ln>
+                <a:solidFill>
+                  <a:srgbClr val="000000"/>
+                </a:solidFill>
+                <a:effectLst/>
+                <a:latin typeface="Courier New" panose="02070309020205020404" pitchFamily="49" charset="0"/>
+                <a:cs typeface="Courier New" panose="02070309020205020404" pitchFamily="49" charset="0"/>
+              </a:rPr>
+            </a:br>
+            <a:r>
+              <a:rPr kumimoji="0" lang="en-US" altLang="en-US" sz="1600" b="0" i="0" u="none" strike="noStrike" cap="none" normalizeH="0" baseline="0" dirty="0" smtClean="0">
+                <a:ln>
+                  <a:noFill/>
+                </a:ln>
+                <a:solidFill>
+                  <a:srgbClr val="20999D"/>
+                </a:solidFill>
+                <a:effectLst/>
+                <a:latin typeface="Courier New" panose="02070309020205020404" pitchFamily="49" charset="0"/>
+                <a:cs typeface="Courier New" panose="02070309020205020404" pitchFamily="49" charset="0"/>
+              </a:rPr>
+              <a:t>T </a:t>
+            </a:r>
+            <a:r>
+              <a:rPr kumimoji="0" lang="en-US" altLang="en-US" sz="1600" b="0" i="0" u="none" strike="noStrike" cap="none" normalizeH="0" baseline="0" dirty="0" err="1" smtClean="0">
+                <a:ln>
+                  <a:noFill/>
+                </a:ln>
+                <a:solidFill>
+                  <a:srgbClr val="000000"/>
+                </a:solidFill>
+                <a:effectLst/>
+                <a:latin typeface="Courier New" panose="02070309020205020404" pitchFamily="49" charset="0"/>
+                <a:cs typeface="Courier New" panose="02070309020205020404" pitchFamily="49" charset="0"/>
+              </a:rPr>
+              <a:t>orElseThrow</a:t>
+            </a:r>
+            <a:r>
+              <a:rPr kumimoji="0" lang="en-US" altLang="en-US" sz="1600" b="0" i="0" u="none" strike="noStrike" cap="none" normalizeH="0" baseline="0" dirty="0" smtClean="0">
+                <a:ln>
+                  <a:noFill/>
+                </a:ln>
+                <a:solidFill>
+                  <a:srgbClr val="000000"/>
+                </a:solidFill>
+                <a:effectLst/>
+                <a:latin typeface="Courier New" panose="02070309020205020404" pitchFamily="49" charset="0"/>
+                <a:cs typeface="Courier New" panose="02070309020205020404" pitchFamily="49" charset="0"/>
+              </a:rPr>
+              <a:t>();</a:t>
+            </a:r>
+            <a:br>
+              <a:rPr kumimoji="0" lang="en-US" altLang="en-US" sz="1600" b="0" i="0" u="none" strike="noStrike" cap="none" normalizeH="0" baseline="0" dirty="0" smtClean="0">
+                <a:ln>
+                  <a:noFill/>
+                </a:ln>
+                <a:solidFill>
+                  <a:srgbClr val="000000"/>
+                </a:solidFill>
+                <a:effectLst/>
+                <a:latin typeface="Courier New" panose="02070309020205020404" pitchFamily="49" charset="0"/>
+                <a:cs typeface="Courier New" panose="02070309020205020404" pitchFamily="49" charset="0"/>
+              </a:rPr>
+            </a:br>
+            <a:r>
+              <a:rPr kumimoji="0" lang="en-US" altLang="en-US" sz="1600" b="0" i="0" u="none" strike="noStrike" cap="none" normalizeH="0" baseline="0" dirty="0" smtClean="0">
+                <a:ln>
+                  <a:noFill/>
+                </a:ln>
+                <a:solidFill>
+                  <a:srgbClr val="000000"/>
+                </a:solidFill>
+                <a:effectLst/>
+                <a:latin typeface="Courier New" panose="02070309020205020404" pitchFamily="49" charset="0"/>
+                <a:cs typeface="Courier New" panose="02070309020205020404" pitchFamily="49" charset="0"/>
+              </a:rPr>
+              <a:t>&lt;</a:t>
+            </a:r>
+            <a:r>
+              <a:rPr kumimoji="0" lang="en-US" altLang="en-US" sz="1600" b="0" i="0" u="none" strike="noStrike" cap="none" normalizeH="0" baseline="0" dirty="0" smtClean="0">
+                <a:ln>
+                  <a:noFill/>
+                </a:ln>
+                <a:solidFill>
+                  <a:srgbClr val="20999D"/>
+                </a:solidFill>
+                <a:effectLst/>
+                <a:latin typeface="Courier New" panose="02070309020205020404" pitchFamily="49" charset="0"/>
+                <a:cs typeface="Courier New" panose="02070309020205020404" pitchFamily="49" charset="0"/>
+              </a:rPr>
+              <a:t>X </a:t>
+            </a:r>
+            <a:r>
+              <a:rPr kumimoji="0" lang="en-US" altLang="en-US" sz="1600" b="1" i="0" u="none" strike="noStrike" cap="none" normalizeH="0" baseline="0" dirty="0" smtClean="0">
+                <a:ln>
+                  <a:noFill/>
+                </a:ln>
+                <a:solidFill>
+                  <a:srgbClr val="000080"/>
+                </a:solidFill>
+                <a:effectLst/>
+                <a:latin typeface="Courier New" panose="02070309020205020404" pitchFamily="49" charset="0"/>
+                <a:cs typeface="Courier New" panose="02070309020205020404" pitchFamily="49" charset="0"/>
+              </a:rPr>
+              <a:t>extends </a:t>
+            </a:r>
+            <a:r>
+              <a:rPr kumimoji="0" lang="en-US" altLang="en-US" sz="1600" b="0" i="0" u="none" strike="noStrike" cap="none" normalizeH="0" baseline="0" dirty="0" err="1" smtClean="0">
+                <a:ln>
+                  <a:noFill/>
+                </a:ln>
+                <a:solidFill>
+                  <a:srgbClr val="000000"/>
+                </a:solidFill>
+                <a:effectLst/>
+                <a:latin typeface="Courier New" panose="02070309020205020404" pitchFamily="49" charset="0"/>
+                <a:cs typeface="Courier New" panose="02070309020205020404" pitchFamily="49" charset="0"/>
+              </a:rPr>
+              <a:t>Throwable</a:t>
+            </a:r>
+            <a:r>
+              <a:rPr kumimoji="0" lang="en-US" altLang="en-US" sz="1600" b="0" i="0" u="none" strike="noStrike" cap="none" normalizeH="0" baseline="0" dirty="0" smtClean="0">
+                <a:ln>
+                  <a:noFill/>
+                </a:ln>
+                <a:solidFill>
+                  <a:srgbClr val="000000"/>
+                </a:solidFill>
+                <a:effectLst/>
+                <a:latin typeface="Courier New" panose="02070309020205020404" pitchFamily="49" charset="0"/>
+                <a:cs typeface="Courier New" panose="02070309020205020404" pitchFamily="49" charset="0"/>
+              </a:rPr>
+              <a:t>&gt; </a:t>
+            </a:r>
+            <a:r>
+              <a:rPr kumimoji="0" lang="en-US" altLang="en-US" sz="1600" b="0" i="0" u="none" strike="noStrike" cap="none" normalizeH="0" baseline="0" dirty="0" smtClean="0">
+                <a:ln>
+                  <a:noFill/>
+                </a:ln>
+                <a:solidFill>
+                  <a:srgbClr val="20999D"/>
+                </a:solidFill>
+                <a:effectLst/>
+                <a:latin typeface="Courier New" panose="02070309020205020404" pitchFamily="49" charset="0"/>
+                <a:cs typeface="Courier New" panose="02070309020205020404" pitchFamily="49" charset="0"/>
+              </a:rPr>
+              <a:t>T </a:t>
+            </a:r>
+            <a:r>
+              <a:rPr kumimoji="0" lang="en-US" altLang="en-US" sz="1600" b="0" i="0" u="none" strike="noStrike" cap="none" normalizeH="0" baseline="0" dirty="0" err="1" smtClean="0">
+                <a:ln>
+                  <a:noFill/>
+                </a:ln>
+                <a:solidFill>
+                  <a:srgbClr val="000000"/>
+                </a:solidFill>
+                <a:effectLst/>
+                <a:latin typeface="Courier New" panose="02070309020205020404" pitchFamily="49" charset="0"/>
+                <a:cs typeface="Courier New" panose="02070309020205020404" pitchFamily="49" charset="0"/>
+              </a:rPr>
+              <a:t>orElseThrow</a:t>
+            </a:r>
+            <a:r>
+              <a:rPr kumimoji="0" lang="en-US" altLang="en-US" sz="1600" b="0" i="0" u="none" strike="noStrike" cap="none" normalizeH="0" baseline="0" dirty="0" smtClean="0">
+                <a:ln>
+                  <a:noFill/>
+                </a:ln>
+                <a:solidFill>
+                  <a:srgbClr val="000000"/>
+                </a:solidFill>
+                <a:effectLst/>
+                <a:latin typeface="Courier New" panose="02070309020205020404" pitchFamily="49" charset="0"/>
+                <a:cs typeface="Courier New" panose="02070309020205020404" pitchFamily="49" charset="0"/>
+              </a:rPr>
+              <a:t>(Supplier&lt;? </a:t>
+            </a:r>
+            <a:r>
+              <a:rPr kumimoji="0" lang="en-US" altLang="en-US" sz="1600" b="1" i="0" u="none" strike="noStrike" cap="none" normalizeH="0" baseline="0" dirty="0" smtClean="0">
+                <a:ln>
+                  <a:noFill/>
+                </a:ln>
+                <a:solidFill>
+                  <a:srgbClr val="000080"/>
+                </a:solidFill>
+                <a:effectLst/>
+                <a:latin typeface="Courier New" panose="02070309020205020404" pitchFamily="49" charset="0"/>
+                <a:cs typeface="Courier New" panose="02070309020205020404" pitchFamily="49" charset="0"/>
+              </a:rPr>
+              <a:t>extends </a:t>
+            </a:r>
+            <a:r>
+              <a:rPr kumimoji="0" lang="en-US" altLang="en-US" sz="1600" b="0" i="0" u="none" strike="noStrike" cap="none" normalizeH="0" baseline="0" dirty="0" smtClean="0">
+                <a:ln>
+                  <a:noFill/>
+                </a:ln>
+                <a:solidFill>
+                  <a:srgbClr val="20999D"/>
+                </a:solidFill>
+                <a:effectLst/>
+                <a:latin typeface="Courier New" panose="02070309020205020404" pitchFamily="49" charset="0"/>
+                <a:cs typeface="Courier New" panose="02070309020205020404" pitchFamily="49" charset="0"/>
+              </a:rPr>
+              <a:t>X</a:t>
+            </a:r>
+            <a:r>
+              <a:rPr kumimoji="0" lang="en-US" altLang="en-US" sz="1600" b="0" i="0" u="none" strike="noStrike" cap="none" normalizeH="0" baseline="0" dirty="0" smtClean="0">
+                <a:ln>
+                  <a:noFill/>
+                </a:ln>
+                <a:solidFill>
+                  <a:srgbClr val="000000"/>
+                </a:solidFill>
+                <a:effectLst/>
+                <a:latin typeface="Courier New" panose="02070309020205020404" pitchFamily="49" charset="0"/>
+                <a:cs typeface="Courier New" panose="02070309020205020404" pitchFamily="49" charset="0"/>
+              </a:rPr>
+              <a:t>&gt; </a:t>
+            </a:r>
+            <a:r>
+              <a:rPr kumimoji="0" lang="en-US" altLang="en-US" sz="1600" b="0" i="0" u="none" strike="noStrike" cap="none" normalizeH="0" baseline="0" dirty="0" err="1" smtClean="0">
+                <a:ln>
+                  <a:noFill/>
+                </a:ln>
+                <a:solidFill>
+                  <a:srgbClr val="000000"/>
+                </a:solidFill>
+                <a:effectLst/>
+                <a:latin typeface="Courier New" panose="02070309020205020404" pitchFamily="49" charset="0"/>
+                <a:cs typeface="Courier New" panose="02070309020205020404" pitchFamily="49" charset="0"/>
+              </a:rPr>
+              <a:t>exceptionSupplier</a:t>
+            </a:r>
+            <a:r>
+              <a:rPr kumimoji="0" lang="en-US" altLang="en-US" sz="1600" b="0" i="0" u="none" strike="noStrike" cap="none" normalizeH="0" baseline="0" dirty="0" smtClean="0">
+                <a:ln>
+                  <a:noFill/>
+                </a:ln>
+                <a:solidFill>
+                  <a:srgbClr val="000000"/>
+                </a:solidFill>
+                <a:effectLst/>
+                <a:latin typeface="Courier New" panose="02070309020205020404" pitchFamily="49" charset="0"/>
+                <a:cs typeface="Courier New" panose="02070309020205020404" pitchFamily="49" charset="0"/>
+              </a:rPr>
+              <a:t>) </a:t>
+            </a:r>
+            <a:r>
+              <a:rPr kumimoji="0" lang="en-US" altLang="en-US" sz="1600" b="1" i="0" u="none" strike="noStrike" cap="none" normalizeH="0" baseline="0" dirty="0" smtClean="0">
+                <a:ln>
+                  <a:noFill/>
+                </a:ln>
+                <a:solidFill>
+                  <a:srgbClr val="000080"/>
+                </a:solidFill>
+                <a:effectLst/>
+                <a:latin typeface="Courier New" panose="02070309020205020404" pitchFamily="49" charset="0"/>
+                <a:cs typeface="Courier New" panose="02070309020205020404" pitchFamily="49" charset="0"/>
+              </a:rPr>
+              <a:t>throws </a:t>
+            </a:r>
+            <a:r>
+              <a:rPr kumimoji="0" lang="en-US" altLang="en-US" sz="1600" b="0" i="0" u="none" strike="noStrike" cap="none" normalizeH="0" baseline="0" dirty="0" smtClean="0">
+                <a:ln>
+                  <a:noFill/>
+                </a:ln>
+                <a:solidFill>
+                  <a:srgbClr val="20999D"/>
+                </a:solidFill>
+                <a:effectLst/>
+                <a:latin typeface="Courier New" panose="02070309020205020404" pitchFamily="49" charset="0"/>
+                <a:cs typeface="Courier New" panose="02070309020205020404" pitchFamily="49" charset="0"/>
+              </a:rPr>
+              <a:t>X</a:t>
+            </a:r>
+            <a:r>
+              <a:rPr kumimoji="0" lang="en-US" altLang="en-US" sz="1600" b="0" i="0" u="none" strike="noStrike" cap="none" normalizeH="0" baseline="0" dirty="0" smtClean="0">
+                <a:ln>
+                  <a:noFill/>
+                </a:ln>
+                <a:solidFill>
+                  <a:srgbClr val="000000"/>
+                </a:solidFill>
+                <a:effectLst/>
+                <a:latin typeface="Courier New" panose="02070309020205020404" pitchFamily="49" charset="0"/>
+                <a:cs typeface="Courier New" panose="02070309020205020404" pitchFamily="49" charset="0"/>
+              </a:rPr>
+              <a:t>;</a:t>
+            </a:r>
+            <a:endParaRPr kumimoji="0" lang="en-US" altLang="en-US" sz="4000" b="0" i="0" u="none" strike="noStrike" cap="none" normalizeH="0" baseline="0" dirty="0" smtClean="0">
+              <a:ln>
+                <a:noFill/>
+              </a:ln>
+              <a:solidFill>
+                <a:schemeClr val="tx1"/>
+              </a:solidFill>
+              <a:effectLst/>
+              <a:latin typeface="Arial" panose="020B0604020202020204" pitchFamily="34" charset="0"/>
+            </a:endParaRPr>
+          </a:p>
+        </p:txBody>
+      </p:sp>
     </p:spTree>
     <p:extLst>
       <p:ext uri="{BB962C8B-B14F-4D97-AF65-F5344CB8AC3E}">
-        <p14:creationId xmlns:p14="http://schemas.microsoft.com/office/powerpoint/2010/main" val="3801187224"/>
+        <p14:creationId xmlns:p14="http://schemas.microsoft.com/office/powerpoint/2010/main" val="1389866165"/>
       </p:ext>
     </p:extLst>
   </p:cSld>
@@ -18154,6 +19911,20 @@
                 <a:cs typeface="Courier New" panose="02070309020205020404" pitchFamily="49" charset="0"/>
               </a:rPr>
             </a:br>
+            <a:r>
+              <a:rPr kumimoji="0" lang="ru-RU" altLang="ru-RU" sz="1200" b="0" i="0" u="none" strike="noStrike" cap="none" normalizeH="0" baseline="0" dirty="0">
+                <a:ln>
+                  <a:noFill/>
+                </a:ln>
+                <a:solidFill>
+                  <a:srgbClr val="000000"/>
+                </a:solidFill>
+                <a:effectLst/>
+                <a:latin typeface="Courier New" panose="02070309020205020404" pitchFamily="49" charset="0"/>
+                <a:cs typeface="Courier New" panose="02070309020205020404" pitchFamily="49" charset="0"/>
+              </a:rPr>
+              <a:t/>
+            </a:r>
             <a:br>
               <a:rPr kumimoji="0" lang="ru-RU" altLang="ru-RU" sz="1200" b="0" i="0" u="none" strike="noStrike" cap="none" normalizeH="0" baseline="0" dirty="0">
                 <a:ln>
@@ -18541,6 +20312,20 @@
                 <a:cs typeface="Courier New" panose="02070309020205020404" pitchFamily="49" charset="0"/>
               </a:rPr>
             </a:br>
+            <a:r>
+              <a:rPr kumimoji="0" lang="ru-RU" altLang="ru-RU" sz="1200" b="0" i="0" u="none" strike="noStrike" cap="none" normalizeH="0" baseline="0" dirty="0">
+                <a:ln>
+                  <a:noFill/>
+                </a:ln>
+                <a:solidFill>
+                  <a:srgbClr val="000000"/>
+                </a:solidFill>
+                <a:effectLst/>
+                <a:latin typeface="Courier New" panose="02070309020205020404" pitchFamily="49" charset="0"/>
+                <a:cs typeface="Courier New" panose="02070309020205020404" pitchFamily="49" charset="0"/>
+              </a:rPr>
+              <a:t/>
+            </a:r>
             <a:br>
               <a:rPr kumimoji="0" lang="ru-RU" altLang="ru-RU" sz="1200" b="0" i="0" u="none" strike="noStrike" cap="none" normalizeH="0" baseline="0" dirty="0">
                 <a:ln>
@@ -19012,6 +20797,16 @@
               </a:rPr>
               <a:t>Optional.empty</a:t>
             </a:r>
+            <a:r>
+              <a:rPr lang="uk-UA" altLang="uk-UA" sz="1200" i="1" dirty="0">
+                <a:solidFill>
+                  <a:srgbClr val="808080"/>
+                </a:solidFill>
+                <a:latin typeface="Courier New" panose="02070309020205020404" pitchFamily="49" charset="0"/>
+                <a:cs typeface="Courier New" panose="02070309020205020404" pitchFamily="49" charset="0"/>
+              </a:rPr>
+              <a:t/>
+            </a:r>
             <a:br>
               <a:rPr lang="uk-UA" altLang="uk-UA" sz="1200" i="1" dirty="0">
                 <a:solidFill>
@@ -19021,6 +20816,16 @@
                 <a:cs typeface="Courier New" panose="02070309020205020404" pitchFamily="49" charset="0"/>
               </a:rPr>
             </a:br>
+            <a:r>
+              <a:rPr lang="uk-UA" altLang="uk-UA" sz="1200" i="1" dirty="0">
+                <a:solidFill>
+                  <a:srgbClr val="808080"/>
+                </a:solidFill>
+                <a:latin typeface="Courier New" panose="02070309020205020404" pitchFamily="49" charset="0"/>
+                <a:cs typeface="Courier New" panose="02070309020205020404" pitchFamily="49" charset="0"/>
+              </a:rPr>
+              <a:t/>
+            </a:r>
             <a:br>
               <a:rPr lang="uk-UA" altLang="uk-UA" sz="1200" i="1" dirty="0">
                 <a:solidFill>
@@ -19119,6 +20924,16 @@
                 <a:cs typeface="Courier New" panose="02070309020205020404" pitchFamily="49" charset="0"/>
               </a:rPr>
               <a:t>NoSuchElementException</a:t>
+            </a:r>
+            <a:r>
+              <a:rPr lang="uk-UA" altLang="uk-UA" sz="1200" i="1" dirty="0">
+                <a:solidFill>
+                  <a:srgbClr val="808080"/>
+                </a:solidFill>
+                <a:latin typeface="Courier New" panose="02070309020205020404" pitchFamily="49" charset="0"/>
+                <a:cs typeface="Courier New" panose="02070309020205020404" pitchFamily="49" charset="0"/>
+              </a:rPr>
+              <a:t/>
             </a:r>
             <a:br>
               <a:rPr lang="uk-UA" altLang="uk-UA" sz="1200" i="1" dirty="0">
@@ -19353,6 +21168,16 @@
               </a:rPr>
               <a:t>null</a:t>
             </a:r>
+            <a:r>
+              <a:rPr lang="uk-UA" altLang="uk-UA" sz="1200" i="1" dirty="0">
+                <a:solidFill>
+                  <a:srgbClr val="808080"/>
+                </a:solidFill>
+                <a:latin typeface="Courier New" panose="02070309020205020404" pitchFamily="49" charset="0"/>
+                <a:cs typeface="Courier New" panose="02070309020205020404" pitchFamily="49" charset="0"/>
+              </a:rPr>
+              <a:t/>
+            </a:r>
             <a:br>
               <a:rPr lang="uk-UA" altLang="uk-UA" sz="1200" i="1" dirty="0">
                 <a:solidFill>
@@ -19362,6 +21187,16 @@
                 <a:cs typeface="Courier New" panose="02070309020205020404" pitchFamily="49" charset="0"/>
               </a:rPr>
             </a:br>
+            <a:r>
+              <a:rPr lang="uk-UA" altLang="uk-UA" sz="1200" i="1" dirty="0">
+                <a:solidFill>
+                  <a:srgbClr val="808080"/>
+                </a:solidFill>
+                <a:latin typeface="Courier New" panose="02070309020205020404" pitchFamily="49" charset="0"/>
+                <a:cs typeface="Courier New" panose="02070309020205020404" pitchFamily="49" charset="0"/>
+              </a:rPr>
+              <a:t/>
+            </a:r>
             <a:br>
               <a:rPr lang="uk-UA" altLang="uk-UA" sz="1200" i="1" dirty="0">
                 <a:solidFill>
@@ -19609,6 +21444,16 @@
                 <a:cs typeface="Courier New" panose="02070309020205020404" pitchFamily="49" charset="0"/>
               </a:rPr>
             </a:br>
+            <a:r>
+              <a:rPr lang="uk-UA" altLang="uk-UA" sz="1200" i="1" dirty="0">
+                <a:solidFill>
+                  <a:srgbClr val="808080"/>
+                </a:solidFill>
+                <a:latin typeface="Courier New" panose="02070309020205020404" pitchFamily="49" charset="0"/>
+                <a:cs typeface="Courier New" panose="02070309020205020404" pitchFamily="49" charset="0"/>
+              </a:rPr>
+              <a:t/>
+            </a:r>
             <a:br>
               <a:rPr lang="uk-UA" altLang="uk-UA" sz="1200" i="1" dirty="0">
                 <a:solidFill>
@@ -19747,6 +21592,16 @@
                 <a:cs typeface="Courier New" panose="02070309020205020404" pitchFamily="49" charset="0"/>
               </a:rPr>
               <a:t>printed</a:t>
+            </a:r>
+            <a:r>
+              <a:rPr lang="uk-UA" altLang="uk-UA" sz="1200" i="1" dirty="0">
+                <a:solidFill>
+                  <a:srgbClr val="808080"/>
+                </a:solidFill>
+                <a:latin typeface="Courier New" panose="02070309020205020404" pitchFamily="49" charset="0"/>
+                <a:cs typeface="Courier New" panose="02070309020205020404" pitchFamily="49" charset="0"/>
+              </a:rPr>
+              <a:t/>
             </a:r>
             <a:br>
               <a:rPr lang="uk-UA" altLang="uk-UA" sz="1200" i="1" dirty="0">

</xml_diff>